<commit_message>
Deployed ff38f18 with MkDocs version: 1.6.1
</commit_message>
<xml_diff>
--- a/files/pbi.pptx
+++ b/files/pbi.pptx
@@ -4,9 +4,16 @@
   <p:sldMasterIdLst>
     <p:sldMasterId id="2147483648" r:id="rId1"/>
   </p:sldMasterIdLst>
+  <p:notesMasterIdLst>
+    <p:notesMasterId r:id="rId8"/>
+  </p:notesMasterIdLst>
   <p:sldIdLst>
     <p:sldId id="256" r:id="rId2"/>
     <p:sldId id="257" r:id="rId3"/>
+    <p:sldId id="258" r:id="rId4"/>
+    <p:sldId id="259" r:id="rId5"/>
+    <p:sldId id="260" r:id="rId6"/>
+    <p:sldId id="261" r:id="rId7"/>
   </p:sldIdLst>
   <p:sldSz cx="12192000" cy="6858000"/>
   <p:notesSz cx="6858000" cy="9144000"/>
@@ -105,7 +112,662 @@
       </a:defRPr>
     </a:lvl9pPr>
   </p:defaultTextStyle>
+  <p:extLst>
+    <p:ext uri="{EFAFB233-063F-42B5-8137-9DF3F51BA10A}">
+      <p15:sldGuideLst xmlns:p15="http://schemas.microsoft.com/office/powerpoint/2012/main"/>
+    </p:ext>
+  </p:extLst>
 </p:presentation>
+</file>
+
+<file path=ppt/notesMasters/notesMaster1.xml><?xml version="1.0" encoding="utf-8"?>
+<p:notesMaster xmlns:a="http://schemas.openxmlformats.org/drawingml/2006/main" xmlns:r="http://schemas.openxmlformats.org/officeDocument/2006/relationships" xmlns:p="http://schemas.openxmlformats.org/presentationml/2006/main">
+  <p:cSld>
+    <p:bg>
+      <p:bgRef idx="1001">
+        <a:schemeClr val="bg1"/>
+      </p:bgRef>
+    </p:bg>
+    <p:spTree>
+      <p:nvGrpSpPr>
+        <p:cNvPr id="1" name=""/>
+        <p:cNvGrpSpPr/>
+        <p:nvPr/>
+      </p:nvGrpSpPr>
+      <p:grpSpPr>
+        <a:xfrm>
+          <a:off x="0" y="0"/>
+          <a:ext cx="0" cy="0"/>
+          <a:chOff x="0" y="0"/>
+          <a:chExt cx="0" cy="0"/>
+        </a:xfrm>
+      </p:grpSpPr>
+      <p:sp>
+        <p:nvSpPr>
+          <p:cNvPr id="2" name="Header Placeholder 1"/>
+          <p:cNvSpPr>
+            <a:spLocks noGrp="1"/>
+          </p:cNvSpPr>
+          <p:nvPr>
+            <p:ph type="hdr" sz="quarter"/>
+          </p:nvPr>
+        </p:nvSpPr>
+        <p:spPr>
+          <a:xfrm>
+            <a:off x="0" y="0"/>
+            <a:ext cx="2971800" cy="458788"/>
+          </a:xfrm>
+          <a:prstGeom prst="rect">
+            <a:avLst/>
+          </a:prstGeom>
+        </p:spPr>
+        <p:txBody>
+          <a:bodyPr vert="horz" lIns="91440" tIns="45720" rIns="91440" bIns="45720" rtlCol="0"/>
+          <a:lstStyle>
+            <a:lvl1pPr algn="l">
+              <a:defRPr sz="1200"/>
+            </a:lvl1pPr>
+          </a:lstStyle>
+          <a:p>
+            <a:endParaRPr lang="en-IN"/>
+          </a:p>
+        </p:txBody>
+      </p:sp>
+      <p:sp>
+        <p:nvSpPr>
+          <p:cNvPr id="3" name="Date Placeholder 2"/>
+          <p:cNvSpPr>
+            <a:spLocks noGrp="1"/>
+          </p:cNvSpPr>
+          <p:nvPr>
+            <p:ph type="dt" idx="1"/>
+          </p:nvPr>
+        </p:nvSpPr>
+        <p:spPr>
+          <a:xfrm>
+            <a:off x="3884613" y="0"/>
+            <a:ext cx="2971800" cy="458788"/>
+          </a:xfrm>
+          <a:prstGeom prst="rect">
+            <a:avLst/>
+          </a:prstGeom>
+        </p:spPr>
+        <p:txBody>
+          <a:bodyPr vert="horz" lIns="91440" tIns="45720" rIns="91440" bIns="45720" rtlCol="0"/>
+          <a:lstStyle>
+            <a:lvl1pPr algn="r">
+              <a:defRPr sz="1200"/>
+            </a:lvl1pPr>
+          </a:lstStyle>
+          <a:p>
+            <a:fld id="{151AF9D3-DFDC-42EA-A39C-B54D9BE76503}" type="datetimeFigureOut">
+              <a:rPr lang="en-IN" smtClean="0"/>
+              <a:t>15-07-2025</a:t>
+            </a:fld>
+            <a:endParaRPr lang="en-IN"/>
+          </a:p>
+        </p:txBody>
+      </p:sp>
+      <p:sp>
+        <p:nvSpPr>
+          <p:cNvPr id="4" name="Slide Image Placeholder 3"/>
+          <p:cNvSpPr>
+            <a:spLocks noGrp="1" noRot="1" noChangeAspect="1"/>
+          </p:cNvSpPr>
+          <p:nvPr>
+            <p:ph type="sldImg" idx="2"/>
+          </p:nvPr>
+        </p:nvSpPr>
+        <p:spPr>
+          <a:xfrm>
+            <a:off x="685800" y="1143000"/>
+            <a:ext cx="5486400" cy="3086100"/>
+          </a:xfrm>
+          <a:prstGeom prst="rect">
+            <a:avLst/>
+          </a:prstGeom>
+          <a:noFill/>
+          <a:ln w="12700">
+            <a:solidFill>
+              <a:prstClr val="black"/>
+            </a:solidFill>
+          </a:ln>
+        </p:spPr>
+        <p:txBody>
+          <a:bodyPr vert="horz" lIns="91440" tIns="45720" rIns="91440" bIns="45720" rtlCol="0" anchor="ctr"/>
+          <a:lstStyle/>
+          <a:p>
+            <a:endParaRPr lang="en-IN"/>
+          </a:p>
+        </p:txBody>
+      </p:sp>
+      <p:sp>
+        <p:nvSpPr>
+          <p:cNvPr id="5" name="Notes Placeholder 4"/>
+          <p:cNvSpPr>
+            <a:spLocks noGrp="1"/>
+          </p:cNvSpPr>
+          <p:nvPr>
+            <p:ph type="body" sz="quarter" idx="3"/>
+          </p:nvPr>
+        </p:nvSpPr>
+        <p:spPr>
+          <a:xfrm>
+            <a:off x="685800" y="4400550"/>
+            <a:ext cx="5486400" cy="3600450"/>
+          </a:xfrm>
+          <a:prstGeom prst="rect">
+            <a:avLst/>
+          </a:prstGeom>
+        </p:spPr>
+        <p:txBody>
+          <a:bodyPr vert="horz" lIns="91440" tIns="45720" rIns="91440" bIns="45720" rtlCol="0"/>
+          <a:lstStyle/>
+          <a:p>
+            <a:pPr lvl="0"/>
+            <a:r>
+              <a:rPr lang="en-US"/>
+              <a:t>Click to edit Master text styles</a:t>
+            </a:r>
+          </a:p>
+          <a:p>
+            <a:pPr lvl="1"/>
+            <a:r>
+              <a:rPr lang="en-US"/>
+              <a:t>Second level</a:t>
+            </a:r>
+          </a:p>
+          <a:p>
+            <a:pPr lvl="2"/>
+            <a:r>
+              <a:rPr lang="en-US"/>
+              <a:t>Third level</a:t>
+            </a:r>
+          </a:p>
+          <a:p>
+            <a:pPr lvl="3"/>
+            <a:r>
+              <a:rPr lang="en-US"/>
+              <a:t>Fourth level</a:t>
+            </a:r>
+          </a:p>
+          <a:p>
+            <a:pPr lvl="4"/>
+            <a:r>
+              <a:rPr lang="en-US"/>
+              <a:t>Fifth level</a:t>
+            </a:r>
+            <a:endParaRPr lang="en-IN"/>
+          </a:p>
+        </p:txBody>
+      </p:sp>
+      <p:sp>
+        <p:nvSpPr>
+          <p:cNvPr id="6" name="Footer Placeholder 5"/>
+          <p:cNvSpPr>
+            <a:spLocks noGrp="1"/>
+          </p:cNvSpPr>
+          <p:nvPr>
+            <p:ph type="ftr" sz="quarter" idx="4"/>
+          </p:nvPr>
+        </p:nvSpPr>
+        <p:spPr>
+          <a:xfrm>
+            <a:off x="0" y="8685213"/>
+            <a:ext cx="2971800" cy="458787"/>
+          </a:xfrm>
+          <a:prstGeom prst="rect">
+            <a:avLst/>
+          </a:prstGeom>
+        </p:spPr>
+        <p:txBody>
+          <a:bodyPr vert="horz" lIns="91440" tIns="45720" rIns="91440" bIns="45720" rtlCol="0" anchor="b"/>
+          <a:lstStyle>
+            <a:lvl1pPr algn="l">
+              <a:defRPr sz="1200"/>
+            </a:lvl1pPr>
+          </a:lstStyle>
+          <a:p>
+            <a:endParaRPr lang="en-IN"/>
+          </a:p>
+        </p:txBody>
+      </p:sp>
+      <p:sp>
+        <p:nvSpPr>
+          <p:cNvPr id="7" name="Slide Number Placeholder 6"/>
+          <p:cNvSpPr>
+            <a:spLocks noGrp="1"/>
+          </p:cNvSpPr>
+          <p:nvPr>
+            <p:ph type="sldNum" sz="quarter" idx="5"/>
+          </p:nvPr>
+        </p:nvSpPr>
+        <p:spPr>
+          <a:xfrm>
+            <a:off x="3884613" y="8685213"/>
+            <a:ext cx="2971800" cy="458787"/>
+          </a:xfrm>
+          <a:prstGeom prst="rect">
+            <a:avLst/>
+          </a:prstGeom>
+        </p:spPr>
+        <p:txBody>
+          <a:bodyPr vert="horz" lIns="91440" tIns="45720" rIns="91440" bIns="45720" rtlCol="0" anchor="b"/>
+          <a:lstStyle>
+            <a:lvl1pPr algn="r">
+              <a:defRPr sz="1200"/>
+            </a:lvl1pPr>
+          </a:lstStyle>
+          <a:p>
+            <a:fld id="{74FD91A7-72B3-4471-A7B3-01E4FFE67B5C}" type="slidenum">
+              <a:rPr lang="en-IN" smtClean="0"/>
+              <a:t>‹#›</a:t>
+            </a:fld>
+            <a:endParaRPr lang="en-IN"/>
+          </a:p>
+        </p:txBody>
+      </p:sp>
+    </p:spTree>
+    <p:extLst>
+      <p:ext uri="{BB962C8B-B14F-4D97-AF65-F5344CB8AC3E}">
+        <p14:creationId xmlns:p14="http://schemas.microsoft.com/office/powerpoint/2010/main" val="2382013254"/>
+      </p:ext>
+    </p:extLst>
+  </p:cSld>
+  <p:clrMap bg1="lt1" tx1="dk1" bg2="lt2" tx2="dk2" accent1="accent1" accent2="accent2" accent3="accent3" accent4="accent4" accent5="accent5" accent6="accent6" hlink="hlink" folHlink="folHlink"/>
+  <p:notesStyle>
+    <a:lvl1pPr marL="0" algn="l" defTabSz="914400" rtl="0" eaLnBrk="1" latinLnBrk="0" hangingPunct="1">
+      <a:defRPr sz="1200" kern="1200">
+        <a:solidFill>
+          <a:schemeClr val="tx1"/>
+        </a:solidFill>
+        <a:latin typeface="+mn-lt"/>
+        <a:ea typeface="+mn-ea"/>
+        <a:cs typeface="+mn-cs"/>
+      </a:defRPr>
+    </a:lvl1pPr>
+    <a:lvl2pPr marL="457200" algn="l" defTabSz="914400" rtl="0" eaLnBrk="1" latinLnBrk="0" hangingPunct="1">
+      <a:defRPr sz="1200" kern="1200">
+        <a:solidFill>
+          <a:schemeClr val="tx1"/>
+        </a:solidFill>
+        <a:latin typeface="+mn-lt"/>
+        <a:ea typeface="+mn-ea"/>
+        <a:cs typeface="+mn-cs"/>
+      </a:defRPr>
+    </a:lvl2pPr>
+    <a:lvl3pPr marL="914400" algn="l" defTabSz="914400" rtl="0" eaLnBrk="1" latinLnBrk="0" hangingPunct="1">
+      <a:defRPr sz="1200" kern="1200">
+        <a:solidFill>
+          <a:schemeClr val="tx1"/>
+        </a:solidFill>
+        <a:latin typeface="+mn-lt"/>
+        <a:ea typeface="+mn-ea"/>
+        <a:cs typeface="+mn-cs"/>
+      </a:defRPr>
+    </a:lvl3pPr>
+    <a:lvl4pPr marL="1371600" algn="l" defTabSz="914400" rtl="0" eaLnBrk="1" latinLnBrk="0" hangingPunct="1">
+      <a:defRPr sz="1200" kern="1200">
+        <a:solidFill>
+          <a:schemeClr val="tx1"/>
+        </a:solidFill>
+        <a:latin typeface="+mn-lt"/>
+        <a:ea typeface="+mn-ea"/>
+        <a:cs typeface="+mn-cs"/>
+      </a:defRPr>
+    </a:lvl4pPr>
+    <a:lvl5pPr marL="1828800" algn="l" defTabSz="914400" rtl="0" eaLnBrk="1" latinLnBrk="0" hangingPunct="1">
+      <a:defRPr sz="1200" kern="1200">
+        <a:solidFill>
+          <a:schemeClr val="tx1"/>
+        </a:solidFill>
+        <a:latin typeface="+mn-lt"/>
+        <a:ea typeface="+mn-ea"/>
+        <a:cs typeface="+mn-cs"/>
+      </a:defRPr>
+    </a:lvl5pPr>
+    <a:lvl6pPr marL="2286000" algn="l" defTabSz="914400" rtl="0" eaLnBrk="1" latinLnBrk="0" hangingPunct="1">
+      <a:defRPr sz="1200" kern="1200">
+        <a:solidFill>
+          <a:schemeClr val="tx1"/>
+        </a:solidFill>
+        <a:latin typeface="+mn-lt"/>
+        <a:ea typeface="+mn-ea"/>
+        <a:cs typeface="+mn-cs"/>
+      </a:defRPr>
+    </a:lvl6pPr>
+    <a:lvl7pPr marL="2743200" algn="l" defTabSz="914400" rtl="0" eaLnBrk="1" latinLnBrk="0" hangingPunct="1">
+      <a:defRPr sz="1200" kern="1200">
+        <a:solidFill>
+          <a:schemeClr val="tx1"/>
+        </a:solidFill>
+        <a:latin typeface="+mn-lt"/>
+        <a:ea typeface="+mn-ea"/>
+        <a:cs typeface="+mn-cs"/>
+      </a:defRPr>
+    </a:lvl7pPr>
+    <a:lvl8pPr marL="3200400" algn="l" defTabSz="914400" rtl="0" eaLnBrk="1" latinLnBrk="0" hangingPunct="1">
+      <a:defRPr sz="1200" kern="1200">
+        <a:solidFill>
+          <a:schemeClr val="tx1"/>
+        </a:solidFill>
+        <a:latin typeface="+mn-lt"/>
+        <a:ea typeface="+mn-ea"/>
+        <a:cs typeface="+mn-cs"/>
+      </a:defRPr>
+    </a:lvl8pPr>
+    <a:lvl9pPr marL="3657600" algn="l" defTabSz="914400" rtl="0" eaLnBrk="1" latinLnBrk="0" hangingPunct="1">
+      <a:defRPr sz="1200" kern="1200">
+        <a:solidFill>
+          <a:schemeClr val="tx1"/>
+        </a:solidFill>
+        <a:latin typeface="+mn-lt"/>
+        <a:ea typeface="+mn-ea"/>
+        <a:cs typeface="+mn-cs"/>
+      </a:defRPr>
+    </a:lvl9pPr>
+  </p:notesStyle>
+</p:notesMaster>
+</file>
+
+<file path=ppt/notesSlides/notesSlide1.xml><?xml version="1.0" encoding="utf-8"?>
+<p:notes xmlns:a="http://schemas.openxmlformats.org/drawingml/2006/main" xmlns:r="http://schemas.openxmlformats.org/officeDocument/2006/relationships" xmlns:p="http://schemas.openxmlformats.org/presentationml/2006/main">
+  <p:cSld>
+    <p:spTree>
+      <p:nvGrpSpPr>
+        <p:cNvPr id="1" name=""/>
+        <p:cNvGrpSpPr/>
+        <p:nvPr/>
+      </p:nvGrpSpPr>
+      <p:grpSpPr>
+        <a:xfrm>
+          <a:off x="0" y="0"/>
+          <a:ext cx="0" cy="0"/>
+          <a:chOff x="0" y="0"/>
+          <a:chExt cx="0" cy="0"/>
+        </a:xfrm>
+      </p:grpSpPr>
+      <p:sp>
+        <p:nvSpPr>
+          <p:cNvPr id="2" name="Slide Image Placeholder 1"/>
+          <p:cNvSpPr>
+            <a:spLocks noGrp="1" noRot="1" noChangeAspect="1"/>
+          </p:cNvSpPr>
+          <p:nvPr>
+            <p:ph type="sldImg"/>
+          </p:nvPr>
+        </p:nvSpPr>
+        <p:spPr/>
+      </p:sp>
+      <p:sp>
+        <p:nvSpPr>
+          <p:cNvPr id="3" name="Notes Placeholder 2"/>
+          <p:cNvSpPr>
+            <a:spLocks noGrp="1"/>
+          </p:cNvSpPr>
+          <p:nvPr>
+            <p:ph type="body" idx="1"/>
+          </p:nvPr>
+        </p:nvSpPr>
+        <p:spPr/>
+        <p:txBody>
+          <a:bodyPr/>
+          <a:lstStyle/>
+          <a:p>
+            <a:endParaRPr lang="en-IN" dirty="0"/>
+          </a:p>
+        </p:txBody>
+      </p:sp>
+      <p:sp>
+        <p:nvSpPr>
+          <p:cNvPr id="4" name="Slide Number Placeholder 3"/>
+          <p:cNvSpPr>
+            <a:spLocks noGrp="1"/>
+          </p:cNvSpPr>
+          <p:nvPr>
+            <p:ph type="sldNum" sz="quarter" idx="5"/>
+          </p:nvPr>
+        </p:nvSpPr>
+        <p:spPr/>
+        <p:txBody>
+          <a:bodyPr/>
+          <a:lstStyle/>
+          <a:p>
+            <a:fld id="{74FD91A7-72B3-4471-A7B3-01E4FFE67B5C}" type="slidenum">
+              <a:rPr lang="en-IN" smtClean="0"/>
+              <a:t>4</a:t>
+            </a:fld>
+            <a:endParaRPr lang="en-IN"/>
+          </a:p>
+        </p:txBody>
+      </p:sp>
+    </p:spTree>
+    <p:extLst>
+      <p:ext uri="{BB962C8B-B14F-4D97-AF65-F5344CB8AC3E}">
+        <p14:creationId xmlns:p14="http://schemas.microsoft.com/office/powerpoint/2010/main" val="3891288233"/>
+      </p:ext>
+    </p:extLst>
+  </p:cSld>
+  <p:clrMapOvr>
+    <a:masterClrMapping/>
+  </p:clrMapOvr>
+</p:notes>
+</file>
+
+<file path=ppt/notesSlides/notesSlide2.xml><?xml version="1.0" encoding="utf-8"?>
+<p:notes xmlns:a="http://schemas.openxmlformats.org/drawingml/2006/main" xmlns:r="http://schemas.openxmlformats.org/officeDocument/2006/relationships" xmlns:p="http://schemas.openxmlformats.org/presentationml/2006/main">
+  <p:cSld>
+    <p:spTree>
+      <p:nvGrpSpPr>
+        <p:cNvPr id="1" name="">
+          <a:extLst>
+            <a:ext uri="{FF2B5EF4-FFF2-40B4-BE49-F238E27FC236}">
+              <a16:creationId xmlns:a16="http://schemas.microsoft.com/office/drawing/2014/main" id="{1EAEF409-F900-8E3C-A3C6-11363B7B3AE4}"/>
+            </a:ext>
+          </a:extLst>
+        </p:cNvPr>
+        <p:cNvGrpSpPr/>
+        <p:nvPr/>
+      </p:nvGrpSpPr>
+      <p:grpSpPr>
+        <a:xfrm>
+          <a:off x="0" y="0"/>
+          <a:ext cx="0" cy="0"/>
+          <a:chOff x="0" y="0"/>
+          <a:chExt cx="0" cy="0"/>
+        </a:xfrm>
+      </p:grpSpPr>
+      <p:sp>
+        <p:nvSpPr>
+          <p:cNvPr id="2" name="Slide Image Placeholder 1">
+            <a:extLst>
+              <a:ext uri="{FF2B5EF4-FFF2-40B4-BE49-F238E27FC236}">
+                <a16:creationId xmlns:a16="http://schemas.microsoft.com/office/drawing/2014/main" id="{940178D2-6CD7-9465-F53B-625CFAA09336}"/>
+              </a:ext>
+            </a:extLst>
+          </p:cNvPr>
+          <p:cNvSpPr>
+            <a:spLocks noGrp="1" noRot="1" noChangeAspect="1"/>
+          </p:cNvSpPr>
+          <p:nvPr>
+            <p:ph type="sldImg"/>
+          </p:nvPr>
+        </p:nvSpPr>
+        <p:spPr/>
+      </p:sp>
+      <p:sp>
+        <p:nvSpPr>
+          <p:cNvPr id="3" name="Notes Placeholder 2">
+            <a:extLst>
+              <a:ext uri="{FF2B5EF4-FFF2-40B4-BE49-F238E27FC236}">
+                <a16:creationId xmlns:a16="http://schemas.microsoft.com/office/drawing/2014/main" id="{D297815C-3F69-E8FA-C897-420A5192E937}"/>
+              </a:ext>
+            </a:extLst>
+          </p:cNvPr>
+          <p:cNvSpPr>
+            <a:spLocks noGrp="1"/>
+          </p:cNvSpPr>
+          <p:nvPr>
+            <p:ph type="body" idx="1"/>
+          </p:nvPr>
+        </p:nvSpPr>
+        <p:spPr/>
+        <p:txBody>
+          <a:bodyPr/>
+          <a:lstStyle/>
+          <a:p>
+            <a:endParaRPr lang="en-IN" dirty="0"/>
+          </a:p>
+        </p:txBody>
+      </p:sp>
+      <p:sp>
+        <p:nvSpPr>
+          <p:cNvPr id="4" name="Slide Number Placeholder 3">
+            <a:extLst>
+              <a:ext uri="{FF2B5EF4-FFF2-40B4-BE49-F238E27FC236}">
+                <a16:creationId xmlns:a16="http://schemas.microsoft.com/office/drawing/2014/main" id="{F4FECFF9-0BDD-E9AD-3590-B4661FF01893}"/>
+              </a:ext>
+            </a:extLst>
+          </p:cNvPr>
+          <p:cNvSpPr>
+            <a:spLocks noGrp="1"/>
+          </p:cNvSpPr>
+          <p:nvPr>
+            <p:ph type="sldNum" sz="quarter" idx="5"/>
+          </p:nvPr>
+        </p:nvSpPr>
+        <p:spPr/>
+        <p:txBody>
+          <a:bodyPr/>
+          <a:lstStyle/>
+          <a:p>
+            <a:fld id="{74FD91A7-72B3-4471-A7B3-01E4FFE67B5C}" type="slidenum">
+              <a:rPr lang="en-IN" smtClean="0"/>
+              <a:t>5</a:t>
+            </a:fld>
+            <a:endParaRPr lang="en-IN"/>
+          </a:p>
+        </p:txBody>
+      </p:sp>
+    </p:spTree>
+    <p:extLst>
+      <p:ext uri="{BB962C8B-B14F-4D97-AF65-F5344CB8AC3E}">
+        <p14:creationId xmlns:p14="http://schemas.microsoft.com/office/powerpoint/2010/main" val="438129913"/>
+      </p:ext>
+    </p:extLst>
+  </p:cSld>
+  <p:clrMapOvr>
+    <a:masterClrMapping/>
+  </p:clrMapOvr>
+</p:notes>
+</file>
+
+<file path=ppt/notesSlides/notesSlide3.xml><?xml version="1.0" encoding="utf-8"?>
+<p:notes xmlns:a="http://schemas.openxmlformats.org/drawingml/2006/main" xmlns:r="http://schemas.openxmlformats.org/officeDocument/2006/relationships" xmlns:p="http://schemas.openxmlformats.org/presentationml/2006/main">
+  <p:cSld>
+    <p:spTree>
+      <p:nvGrpSpPr>
+        <p:cNvPr id="1" name="">
+          <a:extLst>
+            <a:ext uri="{FF2B5EF4-FFF2-40B4-BE49-F238E27FC236}">
+              <a16:creationId xmlns:a16="http://schemas.microsoft.com/office/drawing/2014/main" id="{AF53823B-269D-D438-4E58-70F841CDDE76}"/>
+            </a:ext>
+          </a:extLst>
+        </p:cNvPr>
+        <p:cNvGrpSpPr/>
+        <p:nvPr/>
+      </p:nvGrpSpPr>
+      <p:grpSpPr>
+        <a:xfrm>
+          <a:off x="0" y="0"/>
+          <a:ext cx="0" cy="0"/>
+          <a:chOff x="0" y="0"/>
+          <a:chExt cx="0" cy="0"/>
+        </a:xfrm>
+      </p:grpSpPr>
+      <p:sp>
+        <p:nvSpPr>
+          <p:cNvPr id="2" name="Slide Image Placeholder 1">
+            <a:extLst>
+              <a:ext uri="{FF2B5EF4-FFF2-40B4-BE49-F238E27FC236}">
+                <a16:creationId xmlns:a16="http://schemas.microsoft.com/office/drawing/2014/main" id="{A3DE1967-915B-85A0-4FBE-121EEF10D209}"/>
+              </a:ext>
+            </a:extLst>
+          </p:cNvPr>
+          <p:cNvSpPr>
+            <a:spLocks noGrp="1" noRot="1" noChangeAspect="1"/>
+          </p:cNvSpPr>
+          <p:nvPr>
+            <p:ph type="sldImg"/>
+          </p:nvPr>
+        </p:nvSpPr>
+        <p:spPr/>
+      </p:sp>
+      <p:sp>
+        <p:nvSpPr>
+          <p:cNvPr id="3" name="Notes Placeholder 2">
+            <a:extLst>
+              <a:ext uri="{FF2B5EF4-FFF2-40B4-BE49-F238E27FC236}">
+                <a16:creationId xmlns:a16="http://schemas.microsoft.com/office/drawing/2014/main" id="{CFB736EA-C5D4-363B-2A67-0D200CFE6F61}"/>
+              </a:ext>
+            </a:extLst>
+          </p:cNvPr>
+          <p:cNvSpPr>
+            <a:spLocks noGrp="1"/>
+          </p:cNvSpPr>
+          <p:nvPr>
+            <p:ph type="body" idx="1"/>
+          </p:nvPr>
+        </p:nvSpPr>
+        <p:spPr/>
+        <p:txBody>
+          <a:bodyPr/>
+          <a:lstStyle/>
+          <a:p>
+            <a:endParaRPr lang="en-IN" dirty="0"/>
+          </a:p>
+        </p:txBody>
+      </p:sp>
+      <p:sp>
+        <p:nvSpPr>
+          <p:cNvPr id="4" name="Slide Number Placeholder 3">
+            <a:extLst>
+              <a:ext uri="{FF2B5EF4-FFF2-40B4-BE49-F238E27FC236}">
+                <a16:creationId xmlns:a16="http://schemas.microsoft.com/office/drawing/2014/main" id="{18D0CC52-6ED9-74F8-BC4B-856606898733}"/>
+              </a:ext>
+            </a:extLst>
+          </p:cNvPr>
+          <p:cNvSpPr>
+            <a:spLocks noGrp="1"/>
+          </p:cNvSpPr>
+          <p:nvPr>
+            <p:ph type="sldNum" sz="quarter" idx="5"/>
+          </p:nvPr>
+        </p:nvSpPr>
+        <p:spPr/>
+        <p:txBody>
+          <a:bodyPr/>
+          <a:lstStyle/>
+          <a:p>
+            <a:fld id="{74FD91A7-72B3-4471-A7B3-01E4FFE67B5C}" type="slidenum">
+              <a:rPr lang="en-IN" smtClean="0"/>
+              <a:t>6</a:t>
+            </a:fld>
+            <a:endParaRPr lang="en-IN"/>
+          </a:p>
+        </p:txBody>
+      </p:sp>
+    </p:spTree>
+    <p:extLst>
+      <p:ext uri="{BB962C8B-B14F-4D97-AF65-F5344CB8AC3E}">
+        <p14:creationId xmlns:p14="http://schemas.microsoft.com/office/powerpoint/2010/main" val="1889769233"/>
+      </p:ext>
+    </p:extLst>
+  </p:cSld>
+  <p:clrMapOvr>
+    <a:masterClrMapping/>
+  </p:clrMapOvr>
+</p:notes>
 </file>
 
 <file path=ppt/slideLayouts/slideLayout1.xml><?xml version="1.0" encoding="utf-8"?>
@@ -2760,9 +3422,15 @@
 <p:sldMaster xmlns:a="http://schemas.openxmlformats.org/drawingml/2006/main" xmlns:r="http://schemas.openxmlformats.org/officeDocument/2006/relationships" xmlns:p="http://schemas.openxmlformats.org/presentationml/2006/main">
   <p:cSld>
     <p:bg>
-      <p:bgRef idx="1001">
-        <a:schemeClr val="bg1"/>
-      </p:bgRef>
+      <p:bgPr>
+        <a:solidFill>
+          <a:schemeClr val="bg1">
+            <a:lumMod val="85000"/>
+            <a:alpha val="75000"/>
+          </a:schemeClr>
+        </a:solidFill>
+        <a:effectLst/>
+      </p:bgPr>
     </p:bg>
     <p:spTree>
       <p:nvGrpSpPr>
@@ -3345,58 +4013,41 @@
       </p:grpSpPr>
       <p:sp>
         <p:nvSpPr>
-          <p:cNvPr id="2" name="Title 1">
-            <a:extLst>
-              <a:ext uri="{FF2B5EF4-FFF2-40B4-BE49-F238E27FC236}">
-                <a16:creationId xmlns:a16="http://schemas.microsoft.com/office/drawing/2014/main" id="{A3A78B7E-3A45-F4B3-1B05-27DCB163292A}"/>
-              </a:ext>
-            </a:extLst>
-          </p:cNvPr>
-          <p:cNvSpPr>
-            <a:spLocks noGrp="1"/>
-          </p:cNvSpPr>
-          <p:nvPr>
-            <p:ph type="ctrTitle"/>
-          </p:nvPr>
-        </p:nvSpPr>
-        <p:spPr/>
-        <p:txBody>
-          <a:bodyPr/>
-          <a:lstStyle/>
-          <a:p>
-            <a:r>
-              <a:rPr lang="en-US" dirty="0"/>
-              <a:t>Power BI Training</a:t>
-            </a:r>
-            <a:endParaRPr lang="en-IN" dirty="0"/>
-          </a:p>
-        </p:txBody>
-      </p:sp>
-      <p:sp>
-        <p:nvSpPr>
-          <p:cNvPr id="3" name="Subtitle 2">
-            <a:extLst>
-              <a:ext uri="{FF2B5EF4-FFF2-40B4-BE49-F238E27FC236}">
-                <a16:creationId xmlns:a16="http://schemas.microsoft.com/office/drawing/2014/main" id="{DB239FCD-7BF6-C199-F221-EAFE259763BD}"/>
-              </a:ext>
-            </a:extLst>
-          </p:cNvPr>
-          <p:cNvSpPr>
-            <a:spLocks noGrp="1"/>
-          </p:cNvSpPr>
-          <p:nvPr>
-            <p:ph type="subTitle" idx="1"/>
-          </p:nvPr>
-        </p:nvSpPr>
-        <p:spPr/>
-        <p:txBody>
-          <a:bodyPr/>
-          <a:lstStyle/>
-          <a:p>
-            <a:r>
-              <a:rPr lang="en-US" dirty="0"/>
-              <a:t>Session 1</a:t>
-            </a:r>
+          <p:cNvPr id="8" name="TextBox 7">
+            <a:extLst>
+              <a:ext uri="{FF2B5EF4-FFF2-40B4-BE49-F238E27FC236}">
+                <a16:creationId xmlns:a16="http://schemas.microsoft.com/office/drawing/2014/main" id="{B9D96C10-2C85-520D-8119-5D3971F85496}"/>
+              </a:ext>
+            </a:extLst>
+          </p:cNvPr>
+          <p:cNvSpPr txBox="1"/>
+          <p:nvPr/>
+        </p:nvSpPr>
+        <p:spPr>
+          <a:xfrm>
+            <a:off x="209550" y="2628900"/>
+            <a:ext cx="7489551" cy="584775"/>
+          </a:xfrm>
+          <a:prstGeom prst="rect">
+            <a:avLst/>
+          </a:prstGeom>
+          <a:noFill/>
+        </p:spPr>
+        <p:txBody>
+          <a:bodyPr wrap="none" rtlCol="0">
+            <a:spAutoFit/>
+          </a:bodyPr>
+          <a:lstStyle/>
+          <a:p>
+            <a:r>
+              <a:rPr lang="en-US" sz="3200" b="1" dirty="0">
+                <a:latin typeface="Georgia" panose="02040502050405020303" pitchFamily="18" charset="0"/>
+              </a:rPr>
+              <a:t>Introduction to Power BI and DAX</a:t>
+            </a:r>
+            <a:endParaRPr lang="en-IN" sz="3200" b="1" dirty="0">
+              <a:latin typeface="Georgia" panose="02040502050405020303" pitchFamily="18" charset="0"/>
+            </a:endParaRPr>
           </a:p>
         </p:txBody>
       </p:sp>
@@ -3430,10 +4081,1311 @@
           <a:chExt cx="0" cy="0"/>
         </a:xfrm>
       </p:grpSpPr>
+      <p:sp>
+        <p:nvSpPr>
+          <p:cNvPr id="3" name="Rectangle 2">
+            <a:extLst>
+              <a:ext uri="{FF2B5EF4-FFF2-40B4-BE49-F238E27FC236}">
+                <a16:creationId xmlns:a16="http://schemas.microsoft.com/office/drawing/2014/main" id="{4A06A2D9-425B-AA70-22A4-AC503A1C6589}"/>
+              </a:ext>
+            </a:extLst>
+          </p:cNvPr>
+          <p:cNvSpPr/>
+          <p:nvPr/>
+        </p:nvSpPr>
+        <p:spPr>
+          <a:xfrm>
+            <a:off x="0" y="0"/>
+            <a:ext cx="12192000" cy="828675"/>
+          </a:xfrm>
+          <a:prstGeom prst="rect">
+            <a:avLst/>
+          </a:prstGeom>
+          <a:solidFill>
+            <a:schemeClr val="bg1"/>
+          </a:solidFill>
+          <a:ln>
+            <a:noFill/>
+          </a:ln>
+        </p:spPr>
+        <p:style>
+          <a:lnRef idx="2">
+            <a:schemeClr val="accent1">
+              <a:shade val="15000"/>
+            </a:schemeClr>
+          </a:lnRef>
+          <a:fillRef idx="1">
+            <a:schemeClr val="accent1"/>
+          </a:fillRef>
+          <a:effectRef idx="0">
+            <a:schemeClr val="accent1"/>
+          </a:effectRef>
+          <a:fontRef idx="minor">
+            <a:schemeClr val="lt1"/>
+          </a:fontRef>
+        </p:style>
+        <p:txBody>
+          <a:bodyPr rtlCol="0" anchor="ctr"/>
+          <a:lstStyle/>
+          <a:p>
+            <a:pPr algn="ctr"/>
+            <a:endParaRPr lang="en-IN"/>
+          </a:p>
+        </p:txBody>
+      </p:sp>
+      <p:sp>
+        <p:nvSpPr>
+          <p:cNvPr id="2" name="TextBox 1">
+            <a:extLst>
+              <a:ext uri="{FF2B5EF4-FFF2-40B4-BE49-F238E27FC236}">
+                <a16:creationId xmlns:a16="http://schemas.microsoft.com/office/drawing/2014/main" id="{2A3EA3D6-7059-1749-923A-7A930E4E91E5}"/>
+              </a:ext>
+            </a:extLst>
+          </p:cNvPr>
+          <p:cNvSpPr txBox="1"/>
+          <p:nvPr/>
+        </p:nvSpPr>
+        <p:spPr>
+          <a:xfrm>
+            <a:off x="590550" y="161925"/>
+            <a:ext cx="11601450" cy="461665"/>
+          </a:xfrm>
+          <a:prstGeom prst="rect">
+            <a:avLst/>
+          </a:prstGeom>
+          <a:solidFill>
+            <a:schemeClr val="bg1"/>
+          </a:solidFill>
+        </p:spPr>
+        <p:txBody>
+          <a:bodyPr wrap="square" rtlCol="0">
+            <a:spAutoFit/>
+          </a:bodyPr>
+          <a:lstStyle/>
+          <a:p>
+            <a:r>
+              <a:rPr lang="en-IN" sz="2400" b="1" dirty="0">
+                <a:latin typeface="Georgia" panose="02040502050405020303" pitchFamily="18" charset="0"/>
+              </a:rPr>
+              <a:t>What is DAX?</a:t>
+            </a:r>
+          </a:p>
+        </p:txBody>
+      </p:sp>
+      <p:sp>
+        <p:nvSpPr>
+          <p:cNvPr id="4" name="TextBox 3">
+            <a:extLst>
+              <a:ext uri="{FF2B5EF4-FFF2-40B4-BE49-F238E27FC236}">
+                <a16:creationId xmlns:a16="http://schemas.microsoft.com/office/drawing/2014/main" id="{01822AD6-B49B-0807-E405-3B7603FCAEE4}"/>
+              </a:ext>
+            </a:extLst>
+          </p:cNvPr>
+          <p:cNvSpPr txBox="1"/>
+          <p:nvPr/>
+        </p:nvSpPr>
+        <p:spPr>
+          <a:xfrm>
+            <a:off x="590550" y="1323975"/>
+            <a:ext cx="6568337" cy="4832092"/>
+          </a:xfrm>
+          <a:prstGeom prst="rect">
+            <a:avLst/>
+          </a:prstGeom>
+          <a:noFill/>
+        </p:spPr>
+        <p:txBody>
+          <a:bodyPr wrap="none" rtlCol="0">
+            <a:spAutoFit/>
+          </a:bodyPr>
+          <a:lstStyle/>
+          <a:p>
+            <a:pPr marL="285750" indent="-285750">
+              <a:buFont typeface="Arial" panose="020B0604020202020204" pitchFamily="34" charset="0"/>
+              <a:buChar char="•"/>
+            </a:pPr>
+            <a:r>
+              <a:rPr lang="en-IN" sz="2800" dirty="0"/>
+              <a:t>Programming language </a:t>
+            </a:r>
+          </a:p>
+          <a:p>
+            <a:pPr marL="742950" lvl="1" indent="-285750">
+              <a:buFont typeface="Arial" panose="020B0604020202020204" pitchFamily="34" charset="0"/>
+              <a:buChar char="•"/>
+            </a:pPr>
+            <a:r>
+              <a:rPr lang="en-IN" sz="2800" dirty="0"/>
+              <a:t>Power Pivot</a:t>
+            </a:r>
+          </a:p>
+          <a:p>
+            <a:pPr marL="742950" lvl="1" indent="-285750">
+              <a:buFont typeface="Arial" panose="020B0604020202020204" pitchFamily="34" charset="0"/>
+              <a:buChar char="•"/>
+            </a:pPr>
+            <a:r>
+              <a:rPr lang="en-IN" sz="2800" dirty="0"/>
+              <a:t>SSAS Tabular</a:t>
+            </a:r>
+          </a:p>
+          <a:p>
+            <a:pPr marL="742950" lvl="1" indent="-285750">
+              <a:buFont typeface="Arial" panose="020B0604020202020204" pitchFamily="34" charset="0"/>
+              <a:buChar char="•"/>
+            </a:pPr>
+            <a:r>
+              <a:rPr lang="en-IN" sz="2800" dirty="0"/>
+              <a:t>Power BI</a:t>
+            </a:r>
+          </a:p>
+          <a:p>
+            <a:pPr marL="285750" indent="-285750">
+              <a:buFont typeface="Arial" panose="020B0604020202020204" pitchFamily="34" charset="0"/>
+              <a:buChar char="•"/>
+            </a:pPr>
+            <a:r>
+              <a:rPr lang="en-IN" sz="2800" dirty="0"/>
+              <a:t>Resembles Excel</a:t>
+            </a:r>
+          </a:p>
+          <a:p>
+            <a:pPr marL="742950" lvl="1" indent="-285750">
+              <a:buFont typeface="Arial" panose="020B0604020202020204" pitchFamily="34" charset="0"/>
+              <a:buChar char="•"/>
+            </a:pPr>
+            <a:r>
+              <a:rPr lang="en-US" sz="2800" dirty="0"/>
+              <a:t>Because it was born with PowerPivot</a:t>
+            </a:r>
+          </a:p>
+          <a:p>
+            <a:pPr marL="285750" indent="-285750">
+              <a:buFont typeface="Arial" panose="020B0604020202020204" pitchFamily="34" charset="0"/>
+              <a:buChar char="•"/>
+            </a:pPr>
+            <a:r>
+              <a:rPr lang="en-IN" sz="2800" dirty="0"/>
+              <a:t>Important differences</a:t>
+            </a:r>
+          </a:p>
+          <a:p>
+            <a:pPr marL="742950" lvl="1" indent="-285750">
+              <a:buFont typeface="Arial" panose="020B0604020202020204" pitchFamily="34" charset="0"/>
+              <a:buChar char="•"/>
+            </a:pPr>
+            <a:r>
+              <a:rPr lang="en-US" sz="2800" dirty="0"/>
+              <a:t>No concept of «row» and «column»</a:t>
+            </a:r>
+          </a:p>
+          <a:p>
+            <a:pPr marL="742950" lvl="1" indent="-285750">
+              <a:buFont typeface="Arial" panose="020B0604020202020204" pitchFamily="34" charset="0"/>
+              <a:buChar char="•"/>
+            </a:pPr>
+            <a:r>
+              <a:rPr lang="en-IN" sz="2800" dirty="0"/>
+              <a:t>Different type system</a:t>
+            </a:r>
+          </a:p>
+          <a:p>
+            <a:pPr marL="285750" indent="-285750">
+              <a:buFont typeface="Arial" panose="020B0604020202020204" pitchFamily="34" charset="0"/>
+              <a:buChar char="•"/>
+            </a:pPr>
+            <a:r>
+              <a:rPr lang="en-IN" sz="2800" dirty="0"/>
+              <a:t>Many new functions</a:t>
+            </a:r>
+          </a:p>
+          <a:p>
+            <a:pPr marL="285750" indent="-285750">
+              <a:buFont typeface="Arial" panose="020B0604020202020204" pitchFamily="34" charset="0"/>
+              <a:buChar char="•"/>
+            </a:pPr>
+            <a:r>
+              <a:rPr lang="en-US" sz="2800" dirty="0"/>
+              <a:t>Designed for data models and business</a:t>
+            </a:r>
+          </a:p>
+        </p:txBody>
+      </p:sp>
     </p:spTree>
     <p:extLst>
       <p:ext uri="{BB962C8B-B14F-4D97-AF65-F5344CB8AC3E}">
         <p14:creationId xmlns:p14="http://schemas.microsoft.com/office/powerpoint/2010/main" val="2390939265"/>
+      </p:ext>
+    </p:extLst>
+  </p:cSld>
+  <p:clrMapOvr>
+    <a:masterClrMapping/>
+  </p:clrMapOvr>
+</p:sld>
+</file>
+
+<file path=ppt/slides/slide3.xml><?xml version="1.0" encoding="utf-8"?>
+<p:sld xmlns:a="http://schemas.openxmlformats.org/drawingml/2006/main" xmlns:r="http://schemas.openxmlformats.org/officeDocument/2006/relationships" xmlns:p="http://schemas.openxmlformats.org/presentationml/2006/main">
+  <p:cSld>
+    <p:spTree>
+      <p:nvGrpSpPr>
+        <p:cNvPr id="1" name="">
+          <a:extLst>
+            <a:ext uri="{FF2B5EF4-FFF2-40B4-BE49-F238E27FC236}">
+              <a16:creationId xmlns:a16="http://schemas.microsoft.com/office/drawing/2014/main" id="{1843964D-BAFA-CC41-400C-EBAB8451AAC6}"/>
+            </a:ext>
+          </a:extLst>
+        </p:cNvPr>
+        <p:cNvGrpSpPr/>
+        <p:nvPr/>
+      </p:nvGrpSpPr>
+      <p:grpSpPr>
+        <a:xfrm>
+          <a:off x="0" y="0"/>
+          <a:ext cx="0" cy="0"/>
+          <a:chOff x="0" y="0"/>
+          <a:chExt cx="0" cy="0"/>
+        </a:xfrm>
+      </p:grpSpPr>
+      <p:sp>
+        <p:nvSpPr>
+          <p:cNvPr id="3" name="Rectangle 2">
+            <a:extLst>
+              <a:ext uri="{FF2B5EF4-FFF2-40B4-BE49-F238E27FC236}">
+                <a16:creationId xmlns:a16="http://schemas.microsoft.com/office/drawing/2014/main" id="{47D02D36-D649-D83F-D56E-1A42463633A4}"/>
+              </a:ext>
+            </a:extLst>
+          </p:cNvPr>
+          <p:cNvSpPr/>
+          <p:nvPr/>
+        </p:nvSpPr>
+        <p:spPr>
+          <a:xfrm>
+            <a:off x="0" y="0"/>
+            <a:ext cx="12192000" cy="828675"/>
+          </a:xfrm>
+          <a:prstGeom prst="rect">
+            <a:avLst/>
+          </a:prstGeom>
+          <a:solidFill>
+            <a:schemeClr val="bg1"/>
+          </a:solidFill>
+          <a:ln>
+            <a:noFill/>
+          </a:ln>
+        </p:spPr>
+        <p:style>
+          <a:lnRef idx="2">
+            <a:schemeClr val="accent1">
+              <a:shade val="15000"/>
+            </a:schemeClr>
+          </a:lnRef>
+          <a:fillRef idx="1">
+            <a:schemeClr val="accent1"/>
+          </a:fillRef>
+          <a:effectRef idx="0">
+            <a:schemeClr val="accent1"/>
+          </a:effectRef>
+          <a:fontRef idx="minor">
+            <a:schemeClr val="lt1"/>
+          </a:fontRef>
+        </p:style>
+        <p:txBody>
+          <a:bodyPr rtlCol="0" anchor="ctr"/>
+          <a:lstStyle/>
+          <a:p>
+            <a:pPr algn="ctr"/>
+            <a:endParaRPr lang="en-IN"/>
+          </a:p>
+        </p:txBody>
+      </p:sp>
+      <p:sp>
+        <p:nvSpPr>
+          <p:cNvPr id="2" name="TextBox 1">
+            <a:extLst>
+              <a:ext uri="{FF2B5EF4-FFF2-40B4-BE49-F238E27FC236}">
+                <a16:creationId xmlns:a16="http://schemas.microsoft.com/office/drawing/2014/main" id="{9740CD07-FA8A-D0A1-3CD0-5B89165021B4}"/>
+              </a:ext>
+            </a:extLst>
+          </p:cNvPr>
+          <p:cNvSpPr txBox="1"/>
+          <p:nvPr/>
+        </p:nvSpPr>
+        <p:spPr>
+          <a:xfrm>
+            <a:off x="590550" y="161925"/>
+            <a:ext cx="11601450" cy="461665"/>
+          </a:xfrm>
+          <a:prstGeom prst="rect">
+            <a:avLst/>
+          </a:prstGeom>
+          <a:solidFill>
+            <a:schemeClr val="bg1"/>
+          </a:solidFill>
+        </p:spPr>
+        <p:txBody>
+          <a:bodyPr wrap="square" rtlCol="0">
+            <a:spAutoFit/>
+          </a:bodyPr>
+          <a:lstStyle/>
+          <a:p>
+            <a:r>
+              <a:rPr lang="en-IN" sz="2400" b="1" dirty="0">
+                <a:latin typeface="Georgia" panose="02040502050405020303" pitchFamily="18" charset="0"/>
+              </a:rPr>
+              <a:t>Functional Language</a:t>
+            </a:r>
+          </a:p>
+        </p:txBody>
+      </p:sp>
+      <p:sp>
+        <p:nvSpPr>
+          <p:cNvPr id="4" name="TextBox 3">
+            <a:extLst>
+              <a:ext uri="{FF2B5EF4-FFF2-40B4-BE49-F238E27FC236}">
+                <a16:creationId xmlns:a16="http://schemas.microsoft.com/office/drawing/2014/main" id="{62302352-99FA-5893-AB91-D6F6AF3C1844}"/>
+              </a:ext>
+            </a:extLst>
+          </p:cNvPr>
+          <p:cNvSpPr txBox="1"/>
+          <p:nvPr/>
+        </p:nvSpPr>
+        <p:spPr>
+          <a:xfrm>
+            <a:off x="590550" y="1323975"/>
+            <a:ext cx="10287000" cy="954107"/>
+          </a:xfrm>
+          <a:prstGeom prst="rect">
+            <a:avLst/>
+          </a:prstGeom>
+          <a:noFill/>
+        </p:spPr>
+        <p:txBody>
+          <a:bodyPr wrap="square" rtlCol="0">
+            <a:spAutoFit/>
+          </a:bodyPr>
+          <a:lstStyle/>
+          <a:p>
+            <a:r>
+              <a:rPr lang="en-US" sz="2800" dirty="0"/>
+              <a:t>DAX is a functional language, the execution flows with function calls, here is an example of a DAX formula</a:t>
+            </a:r>
+            <a:endParaRPr lang="en-US" sz="4000" dirty="0"/>
+          </a:p>
+        </p:txBody>
+      </p:sp>
+      <p:sp>
+        <p:nvSpPr>
+          <p:cNvPr id="5" name="TextBox 4">
+            <a:extLst>
+              <a:ext uri="{FF2B5EF4-FFF2-40B4-BE49-F238E27FC236}">
+                <a16:creationId xmlns:a16="http://schemas.microsoft.com/office/drawing/2014/main" id="{5236E857-BE9D-BBD5-3F23-C0AD6DF023DD}"/>
+              </a:ext>
+            </a:extLst>
+          </p:cNvPr>
+          <p:cNvSpPr txBox="1"/>
+          <p:nvPr/>
+        </p:nvSpPr>
+        <p:spPr>
+          <a:xfrm>
+            <a:off x="590550" y="2474893"/>
+            <a:ext cx="10287000" cy="3539430"/>
+          </a:xfrm>
+          <a:prstGeom prst="rect">
+            <a:avLst/>
+          </a:prstGeom>
+          <a:solidFill>
+            <a:schemeClr val="bg1"/>
+          </a:solidFill>
+        </p:spPr>
+        <p:txBody>
+          <a:bodyPr wrap="square" rtlCol="0">
+            <a:spAutoFit/>
+          </a:bodyPr>
+          <a:lstStyle/>
+          <a:p>
+            <a:r>
+              <a:rPr lang="en-US" sz="2800" dirty="0">
+                <a:latin typeface="Cascadia Code" panose="020B0609020000020004" pitchFamily="49" charset="0"/>
+                <a:ea typeface="Cascadia Code" panose="020B0609020000020004" pitchFamily="49" charset="0"/>
+                <a:cs typeface="Cascadia Code" panose="020B0609020000020004" pitchFamily="49" charset="0"/>
+              </a:rPr>
+              <a:t>FMCG Sales Amount = </a:t>
+            </a:r>
+          </a:p>
+          <a:p>
+            <a:r>
+              <a:rPr lang="en-US" sz="2800" dirty="0">
+                <a:latin typeface="Cascadia Code" panose="020B0609020000020004" pitchFamily="49" charset="0"/>
+                <a:ea typeface="Cascadia Code" panose="020B0609020000020004" pitchFamily="49" charset="0"/>
+                <a:cs typeface="Cascadia Code" panose="020B0609020000020004" pitchFamily="49" charset="0"/>
+              </a:rPr>
+              <a:t>	SUMX (</a:t>
+            </a:r>
+          </a:p>
+          <a:p>
+            <a:r>
+              <a:rPr lang="en-US" sz="2800" dirty="0">
+                <a:latin typeface="Cascadia Code" panose="020B0609020000020004" pitchFamily="49" charset="0"/>
+                <a:ea typeface="Cascadia Code" panose="020B0609020000020004" pitchFamily="49" charset="0"/>
+                <a:cs typeface="Cascadia Code" panose="020B0609020000020004" pitchFamily="49" charset="0"/>
+              </a:rPr>
+              <a:t>		FILTER (</a:t>
+            </a:r>
+          </a:p>
+          <a:p>
+            <a:r>
+              <a:rPr lang="en-US" sz="2800" dirty="0">
+                <a:latin typeface="Cascadia Code" panose="020B0609020000020004" pitchFamily="49" charset="0"/>
+                <a:ea typeface="Cascadia Code" panose="020B0609020000020004" pitchFamily="49" charset="0"/>
+                <a:cs typeface="Cascadia Code" panose="020B0609020000020004" pitchFamily="49" charset="0"/>
+              </a:rPr>
+              <a:t>			Sales,</a:t>
+            </a:r>
+          </a:p>
+          <a:p>
+            <a:r>
+              <a:rPr lang="en-US" sz="2800" dirty="0">
+                <a:latin typeface="Cascadia Code" panose="020B0609020000020004" pitchFamily="49" charset="0"/>
+                <a:ea typeface="Cascadia Code" panose="020B0609020000020004" pitchFamily="49" charset="0"/>
+                <a:cs typeface="Cascadia Code" panose="020B0609020000020004" pitchFamily="49" charset="0"/>
+              </a:rPr>
+              <a:t>			Sales[Category]=“FMCG”</a:t>
+            </a:r>
+          </a:p>
+          <a:p>
+            <a:r>
+              <a:rPr lang="en-US" sz="2800" dirty="0">
+                <a:latin typeface="Cascadia Code" panose="020B0609020000020004" pitchFamily="49" charset="0"/>
+                <a:ea typeface="Cascadia Code" panose="020B0609020000020004" pitchFamily="49" charset="0"/>
+                <a:cs typeface="Cascadia Code" panose="020B0609020000020004" pitchFamily="49" charset="0"/>
+              </a:rPr>
+              <a:t>		),</a:t>
+            </a:r>
+          </a:p>
+          <a:p>
+            <a:r>
+              <a:rPr lang="en-US" sz="2800" dirty="0">
+                <a:latin typeface="Cascadia Code" panose="020B0609020000020004" pitchFamily="49" charset="0"/>
+                <a:ea typeface="Cascadia Code" panose="020B0609020000020004" pitchFamily="49" charset="0"/>
+                <a:cs typeface="Cascadia Code" panose="020B0609020000020004" pitchFamily="49" charset="0"/>
+              </a:rPr>
+              <a:t>		Sales[Quantity] * Sales[Rate]</a:t>
+            </a:r>
+          </a:p>
+          <a:p>
+            <a:r>
+              <a:rPr lang="en-US" sz="2800" dirty="0">
+                <a:latin typeface="Cascadia Code" panose="020B0609020000020004" pitchFamily="49" charset="0"/>
+                <a:ea typeface="Cascadia Code" panose="020B0609020000020004" pitchFamily="49" charset="0"/>
+                <a:cs typeface="Cascadia Code" panose="020B0609020000020004" pitchFamily="49" charset="0"/>
+              </a:rPr>
+              <a:t>	)</a:t>
+            </a:r>
+            <a:endParaRPr lang="en-US" sz="4000" dirty="0">
+              <a:latin typeface="Cascadia Code" panose="020B0609020000020004" pitchFamily="49" charset="0"/>
+              <a:ea typeface="Cascadia Code" panose="020B0609020000020004" pitchFamily="49" charset="0"/>
+              <a:cs typeface="Cascadia Code" panose="020B0609020000020004" pitchFamily="49" charset="0"/>
+            </a:endParaRPr>
+          </a:p>
+        </p:txBody>
+      </p:sp>
+    </p:spTree>
+    <p:extLst>
+      <p:ext uri="{BB962C8B-B14F-4D97-AF65-F5344CB8AC3E}">
+        <p14:creationId xmlns:p14="http://schemas.microsoft.com/office/powerpoint/2010/main" val="2552242644"/>
+      </p:ext>
+    </p:extLst>
+  </p:cSld>
+  <p:clrMapOvr>
+    <a:masterClrMapping/>
+  </p:clrMapOvr>
+</p:sld>
+</file>
+
+<file path=ppt/slides/slide4.xml><?xml version="1.0" encoding="utf-8"?>
+<p:sld xmlns:a="http://schemas.openxmlformats.org/drawingml/2006/main" xmlns:r="http://schemas.openxmlformats.org/officeDocument/2006/relationships" xmlns:p="http://schemas.openxmlformats.org/presentationml/2006/main">
+  <p:cSld>
+    <p:spTree>
+      <p:nvGrpSpPr>
+        <p:cNvPr id="1" name="">
+          <a:extLst>
+            <a:ext uri="{FF2B5EF4-FFF2-40B4-BE49-F238E27FC236}">
+              <a16:creationId xmlns:a16="http://schemas.microsoft.com/office/drawing/2014/main" id="{0357CC2B-5A00-4387-3ADE-2649CE2E3ACC}"/>
+            </a:ext>
+          </a:extLst>
+        </p:cNvPr>
+        <p:cNvGrpSpPr/>
+        <p:nvPr/>
+      </p:nvGrpSpPr>
+      <p:grpSpPr>
+        <a:xfrm>
+          <a:off x="0" y="0"/>
+          <a:ext cx="0" cy="0"/>
+          <a:chOff x="0" y="0"/>
+          <a:chExt cx="0" cy="0"/>
+        </a:xfrm>
+      </p:grpSpPr>
+      <p:sp>
+        <p:nvSpPr>
+          <p:cNvPr id="3" name="Rectangle 2">
+            <a:extLst>
+              <a:ext uri="{FF2B5EF4-FFF2-40B4-BE49-F238E27FC236}">
+                <a16:creationId xmlns:a16="http://schemas.microsoft.com/office/drawing/2014/main" id="{94C1227C-1316-0D58-173B-8581BE7EBC43}"/>
+              </a:ext>
+            </a:extLst>
+          </p:cNvPr>
+          <p:cNvSpPr/>
+          <p:nvPr/>
+        </p:nvSpPr>
+        <p:spPr>
+          <a:xfrm>
+            <a:off x="0" y="0"/>
+            <a:ext cx="12192000" cy="828675"/>
+          </a:xfrm>
+          <a:prstGeom prst="rect">
+            <a:avLst/>
+          </a:prstGeom>
+          <a:solidFill>
+            <a:schemeClr val="bg1"/>
+          </a:solidFill>
+          <a:ln>
+            <a:noFill/>
+          </a:ln>
+        </p:spPr>
+        <p:style>
+          <a:lnRef idx="2">
+            <a:schemeClr val="accent1">
+              <a:shade val="15000"/>
+            </a:schemeClr>
+          </a:lnRef>
+          <a:fillRef idx="1">
+            <a:schemeClr val="accent1"/>
+          </a:fillRef>
+          <a:effectRef idx="0">
+            <a:schemeClr val="accent1"/>
+          </a:effectRef>
+          <a:fontRef idx="minor">
+            <a:schemeClr val="lt1"/>
+          </a:fontRef>
+        </p:style>
+        <p:txBody>
+          <a:bodyPr rtlCol="0" anchor="ctr"/>
+          <a:lstStyle/>
+          <a:p>
+            <a:pPr algn="ctr"/>
+            <a:endParaRPr lang="en-IN"/>
+          </a:p>
+        </p:txBody>
+      </p:sp>
+      <p:sp>
+        <p:nvSpPr>
+          <p:cNvPr id="2" name="TextBox 1">
+            <a:extLst>
+              <a:ext uri="{FF2B5EF4-FFF2-40B4-BE49-F238E27FC236}">
+                <a16:creationId xmlns:a16="http://schemas.microsoft.com/office/drawing/2014/main" id="{318E6A38-BBA6-5C25-05F3-108E98B673AC}"/>
+              </a:ext>
+            </a:extLst>
+          </p:cNvPr>
+          <p:cNvSpPr txBox="1"/>
+          <p:nvPr/>
+        </p:nvSpPr>
+        <p:spPr>
+          <a:xfrm>
+            <a:off x="590550" y="161925"/>
+            <a:ext cx="11601450" cy="461665"/>
+          </a:xfrm>
+          <a:prstGeom prst="rect">
+            <a:avLst/>
+          </a:prstGeom>
+          <a:solidFill>
+            <a:schemeClr val="bg1"/>
+          </a:solidFill>
+        </p:spPr>
+        <p:txBody>
+          <a:bodyPr wrap="square" rtlCol="0">
+            <a:spAutoFit/>
+          </a:bodyPr>
+          <a:lstStyle/>
+          <a:p>
+            <a:r>
+              <a:rPr lang="en-IN" sz="2400" b="1" dirty="0">
+                <a:latin typeface="Georgia" panose="02040502050405020303" pitchFamily="18" charset="0"/>
+              </a:rPr>
+              <a:t>Functional Language</a:t>
+            </a:r>
+          </a:p>
+        </p:txBody>
+      </p:sp>
+      <p:sp>
+        <p:nvSpPr>
+          <p:cNvPr id="4" name="TextBox 3">
+            <a:extLst>
+              <a:ext uri="{FF2B5EF4-FFF2-40B4-BE49-F238E27FC236}">
+                <a16:creationId xmlns:a16="http://schemas.microsoft.com/office/drawing/2014/main" id="{8D3C45D6-55DC-6DBB-1D41-93CAE464E198}"/>
+              </a:ext>
+            </a:extLst>
+          </p:cNvPr>
+          <p:cNvSpPr txBox="1"/>
+          <p:nvPr/>
+        </p:nvSpPr>
+        <p:spPr>
+          <a:xfrm>
+            <a:off x="590550" y="1323975"/>
+            <a:ext cx="10287000" cy="954107"/>
+          </a:xfrm>
+          <a:prstGeom prst="rect">
+            <a:avLst/>
+          </a:prstGeom>
+          <a:noFill/>
+        </p:spPr>
+        <p:txBody>
+          <a:bodyPr wrap="square" rtlCol="0">
+            <a:spAutoFit/>
+          </a:bodyPr>
+          <a:lstStyle/>
+          <a:p>
+            <a:r>
+              <a:rPr lang="en-US" sz="2800" dirty="0"/>
+              <a:t>DAX is a functional language, the execution flows with function calls, here is an example of a DAX formula</a:t>
+            </a:r>
+            <a:endParaRPr lang="en-US" sz="4000" dirty="0"/>
+          </a:p>
+        </p:txBody>
+      </p:sp>
+      <p:sp>
+        <p:nvSpPr>
+          <p:cNvPr id="5" name="TextBox 4">
+            <a:extLst>
+              <a:ext uri="{FF2B5EF4-FFF2-40B4-BE49-F238E27FC236}">
+                <a16:creationId xmlns:a16="http://schemas.microsoft.com/office/drawing/2014/main" id="{12723F13-213C-8F28-9764-7EBD6AAEFA01}"/>
+              </a:ext>
+            </a:extLst>
+          </p:cNvPr>
+          <p:cNvSpPr txBox="1"/>
+          <p:nvPr/>
+        </p:nvSpPr>
+        <p:spPr>
+          <a:xfrm>
+            <a:off x="590550" y="2474893"/>
+            <a:ext cx="10287000" cy="3539430"/>
+          </a:xfrm>
+          <a:prstGeom prst="rect">
+            <a:avLst/>
+          </a:prstGeom>
+          <a:solidFill>
+            <a:schemeClr val="bg1"/>
+          </a:solidFill>
+        </p:spPr>
+        <p:txBody>
+          <a:bodyPr wrap="square" rtlCol="0">
+            <a:spAutoFit/>
+          </a:bodyPr>
+          <a:lstStyle/>
+          <a:p>
+            <a:r>
+              <a:rPr lang="en-US" sz="2800" dirty="0">
+                <a:latin typeface="Cascadia Code" panose="020B0609020000020004" pitchFamily="49" charset="0"/>
+                <a:ea typeface="Cascadia Code" panose="020B0609020000020004" pitchFamily="49" charset="0"/>
+                <a:cs typeface="Cascadia Code" panose="020B0609020000020004" pitchFamily="49" charset="0"/>
+              </a:rPr>
+              <a:t>FMCG Sales Amount = </a:t>
+            </a:r>
+          </a:p>
+          <a:p>
+            <a:r>
+              <a:rPr lang="en-US" sz="2800" dirty="0">
+                <a:latin typeface="Cascadia Code" panose="020B0609020000020004" pitchFamily="49" charset="0"/>
+                <a:ea typeface="Cascadia Code" panose="020B0609020000020004" pitchFamily="49" charset="0"/>
+                <a:cs typeface="Cascadia Code" panose="020B0609020000020004" pitchFamily="49" charset="0"/>
+              </a:rPr>
+              <a:t>	</a:t>
+            </a:r>
+            <a:r>
+              <a:rPr lang="en-US" sz="2800" dirty="0">
+                <a:highlight>
+                  <a:srgbClr val="FFFF00"/>
+                </a:highlight>
+                <a:latin typeface="Cascadia Code" panose="020B0609020000020004" pitchFamily="49" charset="0"/>
+                <a:ea typeface="Cascadia Code" panose="020B0609020000020004" pitchFamily="49" charset="0"/>
+                <a:cs typeface="Cascadia Code" panose="020B0609020000020004" pitchFamily="49" charset="0"/>
+              </a:rPr>
+              <a:t>SUMX</a:t>
+            </a:r>
+            <a:r>
+              <a:rPr lang="en-US" sz="2800" dirty="0">
+                <a:latin typeface="Cascadia Code" panose="020B0609020000020004" pitchFamily="49" charset="0"/>
+                <a:ea typeface="Cascadia Code" panose="020B0609020000020004" pitchFamily="49" charset="0"/>
+                <a:cs typeface="Cascadia Code" panose="020B0609020000020004" pitchFamily="49" charset="0"/>
+              </a:rPr>
+              <a:t> (</a:t>
+            </a:r>
+          </a:p>
+          <a:p>
+            <a:r>
+              <a:rPr lang="en-US" sz="2800" dirty="0">
+                <a:latin typeface="Cascadia Code" panose="020B0609020000020004" pitchFamily="49" charset="0"/>
+                <a:ea typeface="Cascadia Code" panose="020B0609020000020004" pitchFamily="49" charset="0"/>
+                <a:cs typeface="Cascadia Code" panose="020B0609020000020004" pitchFamily="49" charset="0"/>
+              </a:rPr>
+              <a:t>		</a:t>
+            </a:r>
+            <a:r>
+              <a:rPr lang="en-US" sz="2800" dirty="0">
+                <a:highlight>
+                  <a:srgbClr val="FFFF00"/>
+                </a:highlight>
+                <a:latin typeface="Cascadia Code" panose="020B0609020000020004" pitchFamily="49" charset="0"/>
+                <a:ea typeface="Cascadia Code" panose="020B0609020000020004" pitchFamily="49" charset="0"/>
+                <a:cs typeface="Cascadia Code" panose="020B0609020000020004" pitchFamily="49" charset="0"/>
+              </a:rPr>
+              <a:t>FILTER</a:t>
+            </a:r>
+            <a:r>
+              <a:rPr lang="en-US" sz="2800" dirty="0">
+                <a:latin typeface="Cascadia Code" panose="020B0609020000020004" pitchFamily="49" charset="0"/>
+                <a:ea typeface="Cascadia Code" panose="020B0609020000020004" pitchFamily="49" charset="0"/>
+                <a:cs typeface="Cascadia Code" panose="020B0609020000020004" pitchFamily="49" charset="0"/>
+              </a:rPr>
+              <a:t> (</a:t>
+            </a:r>
+          </a:p>
+          <a:p>
+            <a:r>
+              <a:rPr lang="en-US" sz="2800" dirty="0">
+                <a:latin typeface="Cascadia Code" panose="020B0609020000020004" pitchFamily="49" charset="0"/>
+                <a:ea typeface="Cascadia Code" panose="020B0609020000020004" pitchFamily="49" charset="0"/>
+                <a:cs typeface="Cascadia Code" panose="020B0609020000020004" pitchFamily="49" charset="0"/>
+              </a:rPr>
+              <a:t>			Sales,</a:t>
+            </a:r>
+          </a:p>
+          <a:p>
+            <a:r>
+              <a:rPr lang="en-US" sz="2800" dirty="0">
+                <a:latin typeface="Cascadia Code" panose="020B0609020000020004" pitchFamily="49" charset="0"/>
+                <a:ea typeface="Cascadia Code" panose="020B0609020000020004" pitchFamily="49" charset="0"/>
+                <a:cs typeface="Cascadia Code" panose="020B0609020000020004" pitchFamily="49" charset="0"/>
+              </a:rPr>
+              <a:t>			Sales[Category]=“FMCG”</a:t>
+            </a:r>
+          </a:p>
+          <a:p>
+            <a:r>
+              <a:rPr lang="en-US" sz="2800" dirty="0">
+                <a:latin typeface="Cascadia Code" panose="020B0609020000020004" pitchFamily="49" charset="0"/>
+                <a:ea typeface="Cascadia Code" panose="020B0609020000020004" pitchFamily="49" charset="0"/>
+                <a:cs typeface="Cascadia Code" panose="020B0609020000020004" pitchFamily="49" charset="0"/>
+              </a:rPr>
+              <a:t>		),</a:t>
+            </a:r>
+          </a:p>
+          <a:p>
+            <a:r>
+              <a:rPr lang="en-US" sz="2800" dirty="0">
+                <a:latin typeface="Cascadia Code" panose="020B0609020000020004" pitchFamily="49" charset="0"/>
+                <a:ea typeface="Cascadia Code" panose="020B0609020000020004" pitchFamily="49" charset="0"/>
+                <a:cs typeface="Cascadia Code" panose="020B0609020000020004" pitchFamily="49" charset="0"/>
+              </a:rPr>
+              <a:t>		Sales[Quantity] * Sales[Rate]</a:t>
+            </a:r>
+          </a:p>
+          <a:p>
+            <a:r>
+              <a:rPr lang="en-US" sz="2800" dirty="0">
+                <a:latin typeface="Cascadia Code" panose="020B0609020000020004" pitchFamily="49" charset="0"/>
+                <a:ea typeface="Cascadia Code" panose="020B0609020000020004" pitchFamily="49" charset="0"/>
+                <a:cs typeface="Cascadia Code" panose="020B0609020000020004" pitchFamily="49" charset="0"/>
+              </a:rPr>
+              <a:t>	)</a:t>
+            </a:r>
+            <a:endParaRPr lang="en-US" sz="4000" dirty="0">
+              <a:latin typeface="Cascadia Code" panose="020B0609020000020004" pitchFamily="49" charset="0"/>
+              <a:ea typeface="Cascadia Code" panose="020B0609020000020004" pitchFamily="49" charset="0"/>
+              <a:cs typeface="Cascadia Code" panose="020B0609020000020004" pitchFamily="49" charset="0"/>
+            </a:endParaRPr>
+          </a:p>
+        </p:txBody>
+      </p:sp>
+    </p:spTree>
+    <p:extLst>
+      <p:ext uri="{BB962C8B-B14F-4D97-AF65-F5344CB8AC3E}">
+        <p14:creationId xmlns:p14="http://schemas.microsoft.com/office/powerpoint/2010/main" val="1817450939"/>
+      </p:ext>
+    </p:extLst>
+  </p:cSld>
+  <p:clrMapOvr>
+    <a:masterClrMapping/>
+  </p:clrMapOvr>
+</p:sld>
+</file>
+
+<file path=ppt/slides/slide5.xml><?xml version="1.0" encoding="utf-8"?>
+<p:sld xmlns:a="http://schemas.openxmlformats.org/drawingml/2006/main" xmlns:r="http://schemas.openxmlformats.org/officeDocument/2006/relationships" xmlns:p="http://schemas.openxmlformats.org/presentationml/2006/main">
+  <p:cSld>
+    <p:spTree>
+      <p:nvGrpSpPr>
+        <p:cNvPr id="1" name="">
+          <a:extLst>
+            <a:ext uri="{FF2B5EF4-FFF2-40B4-BE49-F238E27FC236}">
+              <a16:creationId xmlns:a16="http://schemas.microsoft.com/office/drawing/2014/main" id="{264DEFBC-3AAE-B47E-2E07-E1F343D34D9F}"/>
+            </a:ext>
+          </a:extLst>
+        </p:cNvPr>
+        <p:cNvGrpSpPr/>
+        <p:nvPr/>
+      </p:nvGrpSpPr>
+      <p:grpSpPr>
+        <a:xfrm>
+          <a:off x="0" y="0"/>
+          <a:ext cx="0" cy="0"/>
+          <a:chOff x="0" y="0"/>
+          <a:chExt cx="0" cy="0"/>
+        </a:xfrm>
+      </p:grpSpPr>
+      <p:sp>
+        <p:nvSpPr>
+          <p:cNvPr id="3" name="Rectangle 2">
+            <a:extLst>
+              <a:ext uri="{FF2B5EF4-FFF2-40B4-BE49-F238E27FC236}">
+                <a16:creationId xmlns:a16="http://schemas.microsoft.com/office/drawing/2014/main" id="{7BC8BC5B-1B39-823E-6046-D68C558E6AFA}"/>
+              </a:ext>
+            </a:extLst>
+          </p:cNvPr>
+          <p:cNvSpPr/>
+          <p:nvPr/>
+        </p:nvSpPr>
+        <p:spPr>
+          <a:xfrm>
+            <a:off x="0" y="0"/>
+            <a:ext cx="12192000" cy="828675"/>
+          </a:xfrm>
+          <a:prstGeom prst="rect">
+            <a:avLst/>
+          </a:prstGeom>
+          <a:solidFill>
+            <a:schemeClr val="bg1"/>
+          </a:solidFill>
+          <a:ln>
+            <a:noFill/>
+          </a:ln>
+        </p:spPr>
+        <p:style>
+          <a:lnRef idx="2">
+            <a:schemeClr val="accent1">
+              <a:shade val="15000"/>
+            </a:schemeClr>
+          </a:lnRef>
+          <a:fillRef idx="1">
+            <a:schemeClr val="accent1"/>
+          </a:fillRef>
+          <a:effectRef idx="0">
+            <a:schemeClr val="accent1"/>
+          </a:effectRef>
+          <a:fontRef idx="minor">
+            <a:schemeClr val="lt1"/>
+          </a:fontRef>
+        </p:style>
+        <p:txBody>
+          <a:bodyPr rtlCol="0" anchor="ctr"/>
+          <a:lstStyle/>
+          <a:p>
+            <a:pPr algn="ctr"/>
+            <a:endParaRPr lang="en-IN"/>
+          </a:p>
+        </p:txBody>
+      </p:sp>
+      <p:sp>
+        <p:nvSpPr>
+          <p:cNvPr id="2" name="TextBox 1">
+            <a:extLst>
+              <a:ext uri="{FF2B5EF4-FFF2-40B4-BE49-F238E27FC236}">
+                <a16:creationId xmlns:a16="http://schemas.microsoft.com/office/drawing/2014/main" id="{3D690109-05E6-FDFD-3620-0266BF47FB58}"/>
+              </a:ext>
+            </a:extLst>
+          </p:cNvPr>
+          <p:cNvSpPr txBox="1"/>
+          <p:nvPr/>
+        </p:nvSpPr>
+        <p:spPr>
+          <a:xfrm>
+            <a:off x="590550" y="161925"/>
+            <a:ext cx="11601450" cy="461665"/>
+          </a:xfrm>
+          <a:prstGeom prst="rect">
+            <a:avLst/>
+          </a:prstGeom>
+          <a:solidFill>
+            <a:schemeClr val="bg1"/>
+          </a:solidFill>
+        </p:spPr>
+        <p:txBody>
+          <a:bodyPr wrap="square" rtlCol="0">
+            <a:spAutoFit/>
+          </a:bodyPr>
+          <a:lstStyle/>
+          <a:p>
+            <a:r>
+              <a:rPr lang="en-IN" sz="2400" b="1" dirty="0">
+                <a:latin typeface="Georgia" panose="02040502050405020303" pitchFamily="18" charset="0"/>
+              </a:rPr>
+              <a:t>DAX Data Types</a:t>
+            </a:r>
+          </a:p>
+        </p:txBody>
+      </p:sp>
+      <p:sp>
+        <p:nvSpPr>
+          <p:cNvPr id="4" name="TextBox 3">
+            <a:extLst>
+              <a:ext uri="{FF2B5EF4-FFF2-40B4-BE49-F238E27FC236}">
+                <a16:creationId xmlns:a16="http://schemas.microsoft.com/office/drawing/2014/main" id="{829702A9-1135-737E-16FB-95F77DFA8860}"/>
+              </a:ext>
+            </a:extLst>
+          </p:cNvPr>
+          <p:cNvSpPr txBox="1"/>
+          <p:nvPr/>
+        </p:nvSpPr>
+        <p:spPr>
+          <a:xfrm>
+            <a:off x="590550" y="1323975"/>
+            <a:ext cx="10287000" cy="4524315"/>
+          </a:xfrm>
+          <a:prstGeom prst="rect">
+            <a:avLst/>
+          </a:prstGeom>
+          <a:noFill/>
+        </p:spPr>
+        <p:txBody>
+          <a:bodyPr wrap="square" rtlCol="0">
+            <a:spAutoFit/>
+          </a:bodyPr>
+          <a:lstStyle/>
+          <a:p>
+            <a:r>
+              <a:rPr lang="en-IN" sz="3200" dirty="0"/>
+              <a:t>Numeric types</a:t>
+            </a:r>
+          </a:p>
+          <a:p>
+            <a:pPr marL="457200" indent="-457200">
+              <a:buFont typeface="Arial" panose="020B0604020202020204" pitchFamily="34" charset="0"/>
+              <a:buChar char="•"/>
+            </a:pPr>
+            <a:r>
+              <a:rPr lang="en-IN" sz="3200" dirty="0"/>
+              <a:t>Integer (64 bit)</a:t>
+            </a:r>
+          </a:p>
+          <a:p>
+            <a:pPr marL="457200" indent="-457200">
+              <a:buFont typeface="Arial" panose="020B0604020202020204" pitchFamily="34" charset="0"/>
+              <a:buChar char="•"/>
+            </a:pPr>
+            <a:r>
+              <a:rPr lang="en-IN" sz="3200" dirty="0"/>
+              <a:t>Decimal (floating point)</a:t>
+            </a:r>
+          </a:p>
+          <a:p>
+            <a:pPr marL="457200" indent="-457200">
+              <a:buFont typeface="Arial" panose="020B0604020202020204" pitchFamily="34" charset="0"/>
+              <a:buChar char="•"/>
+            </a:pPr>
+            <a:r>
+              <a:rPr lang="en-IN" sz="3200" dirty="0"/>
+              <a:t>Currency (money)</a:t>
+            </a:r>
+          </a:p>
+          <a:p>
+            <a:pPr marL="457200" indent="-457200">
+              <a:buFont typeface="Arial" panose="020B0604020202020204" pitchFamily="34" charset="0"/>
+              <a:buChar char="•"/>
+            </a:pPr>
+            <a:r>
+              <a:rPr lang="en-IN" sz="3200" dirty="0"/>
+              <a:t>Date (</a:t>
+            </a:r>
+            <a:r>
+              <a:rPr lang="en-IN" sz="3200" dirty="0" err="1"/>
+              <a:t>DateTime</a:t>
+            </a:r>
+            <a:r>
+              <a:rPr lang="en-IN" sz="3200" dirty="0"/>
+              <a:t>)</a:t>
+            </a:r>
+          </a:p>
+          <a:p>
+            <a:pPr marL="457200" indent="-457200">
+              <a:buFont typeface="Arial" panose="020B0604020202020204" pitchFamily="34" charset="0"/>
+              <a:buChar char="•"/>
+            </a:pPr>
+            <a:r>
+              <a:rPr lang="en-IN" sz="3200" dirty="0"/>
+              <a:t>TRUE / FALSE (Boolean)</a:t>
+            </a:r>
+          </a:p>
+          <a:p>
+            <a:r>
+              <a:rPr lang="en-IN" sz="3200" dirty="0"/>
+              <a:t>Other types</a:t>
+            </a:r>
+          </a:p>
+          <a:p>
+            <a:pPr marL="457200" indent="-457200">
+              <a:buFont typeface="Arial" panose="020B0604020202020204" pitchFamily="34" charset="0"/>
+              <a:buChar char="•"/>
+            </a:pPr>
+            <a:r>
+              <a:rPr lang="en-IN" sz="3200" dirty="0"/>
+              <a:t>String</a:t>
+            </a:r>
+          </a:p>
+          <a:p>
+            <a:pPr marL="457200" indent="-457200">
+              <a:buFont typeface="Arial" panose="020B0604020202020204" pitchFamily="34" charset="0"/>
+              <a:buChar char="•"/>
+            </a:pPr>
+            <a:r>
+              <a:rPr lang="en-IN" sz="3200" dirty="0"/>
+              <a:t>Binary Objects</a:t>
+            </a:r>
+          </a:p>
+        </p:txBody>
+      </p:sp>
+    </p:spTree>
+    <p:extLst>
+      <p:ext uri="{BB962C8B-B14F-4D97-AF65-F5344CB8AC3E}">
+        <p14:creationId xmlns:p14="http://schemas.microsoft.com/office/powerpoint/2010/main" val="2526239045"/>
+      </p:ext>
+    </p:extLst>
+  </p:cSld>
+  <p:clrMapOvr>
+    <a:masterClrMapping/>
+  </p:clrMapOvr>
+</p:sld>
+</file>
+
+<file path=ppt/slides/slide6.xml><?xml version="1.0" encoding="utf-8"?>
+<p:sld xmlns:a="http://schemas.openxmlformats.org/drawingml/2006/main" xmlns:r="http://schemas.openxmlformats.org/officeDocument/2006/relationships" xmlns:p="http://schemas.openxmlformats.org/presentationml/2006/main">
+  <p:cSld>
+    <p:spTree>
+      <p:nvGrpSpPr>
+        <p:cNvPr id="1" name="">
+          <a:extLst>
+            <a:ext uri="{FF2B5EF4-FFF2-40B4-BE49-F238E27FC236}">
+              <a16:creationId xmlns:a16="http://schemas.microsoft.com/office/drawing/2014/main" id="{44D1AB83-9F0F-C55E-7E29-4A07603B1070}"/>
+            </a:ext>
+          </a:extLst>
+        </p:cNvPr>
+        <p:cNvGrpSpPr/>
+        <p:nvPr/>
+      </p:nvGrpSpPr>
+      <p:grpSpPr>
+        <a:xfrm>
+          <a:off x="0" y="0"/>
+          <a:ext cx="0" cy="0"/>
+          <a:chOff x="0" y="0"/>
+          <a:chExt cx="0" cy="0"/>
+        </a:xfrm>
+      </p:grpSpPr>
+      <p:sp>
+        <p:nvSpPr>
+          <p:cNvPr id="3" name="Rectangle 2">
+            <a:extLst>
+              <a:ext uri="{FF2B5EF4-FFF2-40B4-BE49-F238E27FC236}">
+                <a16:creationId xmlns:a16="http://schemas.microsoft.com/office/drawing/2014/main" id="{1C36948B-B1BD-1FF4-1F60-152191B0E8B6}"/>
+              </a:ext>
+            </a:extLst>
+          </p:cNvPr>
+          <p:cNvSpPr/>
+          <p:nvPr/>
+        </p:nvSpPr>
+        <p:spPr>
+          <a:xfrm>
+            <a:off x="0" y="0"/>
+            <a:ext cx="12192000" cy="828675"/>
+          </a:xfrm>
+          <a:prstGeom prst="rect">
+            <a:avLst/>
+          </a:prstGeom>
+          <a:solidFill>
+            <a:schemeClr val="bg1"/>
+          </a:solidFill>
+          <a:ln>
+            <a:noFill/>
+          </a:ln>
+        </p:spPr>
+        <p:style>
+          <a:lnRef idx="2">
+            <a:schemeClr val="accent1">
+              <a:shade val="15000"/>
+            </a:schemeClr>
+          </a:lnRef>
+          <a:fillRef idx="1">
+            <a:schemeClr val="accent1"/>
+          </a:fillRef>
+          <a:effectRef idx="0">
+            <a:schemeClr val="accent1"/>
+          </a:effectRef>
+          <a:fontRef idx="minor">
+            <a:schemeClr val="lt1"/>
+          </a:fontRef>
+        </p:style>
+        <p:txBody>
+          <a:bodyPr rtlCol="0" anchor="ctr"/>
+          <a:lstStyle/>
+          <a:p>
+            <a:pPr algn="ctr"/>
+            <a:endParaRPr lang="en-IN"/>
+          </a:p>
+        </p:txBody>
+      </p:sp>
+      <p:sp>
+        <p:nvSpPr>
+          <p:cNvPr id="2" name="TextBox 1">
+            <a:extLst>
+              <a:ext uri="{FF2B5EF4-FFF2-40B4-BE49-F238E27FC236}">
+                <a16:creationId xmlns:a16="http://schemas.microsoft.com/office/drawing/2014/main" id="{7C7453A3-D22A-095C-A7B0-202166DC6099}"/>
+              </a:ext>
+            </a:extLst>
+          </p:cNvPr>
+          <p:cNvSpPr txBox="1"/>
+          <p:nvPr/>
+        </p:nvSpPr>
+        <p:spPr>
+          <a:xfrm>
+            <a:off x="590550" y="161925"/>
+            <a:ext cx="11601450" cy="461665"/>
+          </a:xfrm>
+          <a:prstGeom prst="rect">
+            <a:avLst/>
+          </a:prstGeom>
+          <a:solidFill>
+            <a:schemeClr val="bg1"/>
+          </a:solidFill>
+        </p:spPr>
+        <p:txBody>
+          <a:bodyPr wrap="square" rtlCol="0">
+            <a:spAutoFit/>
+          </a:bodyPr>
+          <a:lstStyle/>
+          <a:p>
+            <a:r>
+              <a:rPr lang="en-IN" sz="2400" b="1" dirty="0">
+                <a:latin typeface="Georgia" panose="02040502050405020303" pitchFamily="18" charset="0"/>
+              </a:rPr>
+              <a:t>DAX Type Handling</a:t>
+            </a:r>
+          </a:p>
+        </p:txBody>
+      </p:sp>
+      <p:sp>
+        <p:nvSpPr>
+          <p:cNvPr id="4" name="TextBox 3">
+            <a:extLst>
+              <a:ext uri="{FF2B5EF4-FFF2-40B4-BE49-F238E27FC236}">
+                <a16:creationId xmlns:a16="http://schemas.microsoft.com/office/drawing/2014/main" id="{6A26CFF3-DB66-F74C-664B-169A5E83823E}"/>
+              </a:ext>
+            </a:extLst>
+          </p:cNvPr>
+          <p:cNvSpPr txBox="1"/>
+          <p:nvPr/>
+        </p:nvSpPr>
+        <p:spPr>
+          <a:xfrm>
+            <a:off x="590550" y="1323975"/>
+            <a:ext cx="10287000" cy="5016758"/>
+          </a:xfrm>
+          <a:prstGeom prst="rect">
+            <a:avLst/>
+          </a:prstGeom>
+          <a:noFill/>
+        </p:spPr>
+        <p:txBody>
+          <a:bodyPr wrap="square" rtlCol="0">
+            <a:spAutoFit/>
+          </a:bodyPr>
+          <a:lstStyle/>
+          <a:p>
+            <a:r>
+              <a:rPr lang="en-US" sz="4000" dirty="0"/>
+              <a:t>Operator Overloading</a:t>
+            </a:r>
+          </a:p>
+          <a:p>
+            <a:pPr marL="457200" indent="-457200">
+              <a:buFont typeface="Arial" panose="020B0604020202020204" pitchFamily="34" charset="0"/>
+              <a:buChar char="•"/>
+            </a:pPr>
+            <a:r>
+              <a:rPr lang="en-US" sz="4000" dirty="0"/>
+              <a:t>Operators are not strongly typed</a:t>
+            </a:r>
+          </a:p>
+          <a:p>
+            <a:pPr marL="457200" indent="-457200">
+              <a:buFont typeface="Arial" panose="020B0604020202020204" pitchFamily="34" charset="0"/>
+              <a:buChar char="•"/>
+            </a:pPr>
+            <a:r>
+              <a:rPr lang="en-US" sz="4000" dirty="0"/>
+              <a:t>The result depends on the inputs</a:t>
+            </a:r>
+          </a:p>
+          <a:p>
+            <a:r>
+              <a:rPr lang="en-US" sz="4000" dirty="0"/>
+              <a:t>Example:</a:t>
+            </a:r>
+          </a:p>
+          <a:p>
+            <a:pPr marL="457200" indent="-457200">
+              <a:buFont typeface="Arial" panose="020B0604020202020204" pitchFamily="34" charset="0"/>
+              <a:buChar char="•"/>
+            </a:pPr>
+            <a:r>
+              <a:rPr lang="en-US" sz="4000" dirty="0"/>
+              <a:t>"5" + "4" = 9</a:t>
+            </a:r>
+          </a:p>
+          <a:p>
+            <a:pPr marL="457200" indent="-457200">
+              <a:buFont typeface="Arial" panose="020B0604020202020204" pitchFamily="34" charset="0"/>
+              <a:buChar char="•"/>
+            </a:pPr>
+            <a:r>
+              <a:rPr lang="en-US" sz="4000" dirty="0"/>
+              <a:t>5 &amp; 4 = "54"</a:t>
+            </a:r>
+          </a:p>
+          <a:p>
+            <a:r>
+              <a:rPr lang="en-US" sz="4000" dirty="0"/>
+              <a:t>Conversion happens when needed</a:t>
+            </a:r>
+          </a:p>
+          <a:p>
+            <a:pPr marL="457200" indent="-457200">
+              <a:buFont typeface="Arial" panose="020B0604020202020204" pitchFamily="34" charset="0"/>
+              <a:buChar char="•"/>
+            </a:pPr>
+            <a:r>
+              <a:rPr lang="en-US" sz="4000" dirty="0" err="1"/>
+              <a:t>i</a:t>
+            </a:r>
+            <a:r>
+              <a:rPr lang="en-US" sz="4000" dirty="0"/>
+              <a:t>. e. when you don’t want it to happen</a:t>
+            </a:r>
+            <a:endParaRPr lang="en-IN" sz="4000" dirty="0"/>
+          </a:p>
+        </p:txBody>
+      </p:sp>
+    </p:spTree>
+    <p:extLst>
+      <p:ext uri="{BB962C8B-B14F-4D97-AF65-F5344CB8AC3E}">
+        <p14:creationId xmlns:p14="http://schemas.microsoft.com/office/powerpoint/2010/main" val="4184274095"/>
       </p:ext>
     </p:extLst>
   </p:cSld>
@@ -3756,4 +5708,319 @@
     </a:ext>
   </a:extLst>
 </a:theme>
+</file>
+
+<file path=ppt/theme/theme2.xml><?xml version="1.0" encoding="utf-8"?>
+<a:theme xmlns:a="http://schemas.openxmlformats.org/drawingml/2006/main" name="Office Theme">
+  <a:themeElements>
+    <a:clrScheme name="Office">
+      <a:dk1>
+        <a:sysClr val="windowText" lastClr="000000"/>
+      </a:dk1>
+      <a:lt1>
+        <a:sysClr val="window" lastClr="FFFFFF"/>
+      </a:lt1>
+      <a:dk2>
+        <a:srgbClr val="0E2841"/>
+      </a:dk2>
+      <a:lt2>
+        <a:srgbClr val="E8E8E8"/>
+      </a:lt2>
+      <a:accent1>
+        <a:srgbClr val="156082"/>
+      </a:accent1>
+      <a:accent2>
+        <a:srgbClr val="E97132"/>
+      </a:accent2>
+      <a:accent3>
+        <a:srgbClr val="196B24"/>
+      </a:accent3>
+      <a:accent4>
+        <a:srgbClr val="0F9ED5"/>
+      </a:accent4>
+      <a:accent5>
+        <a:srgbClr val="A02B93"/>
+      </a:accent5>
+      <a:accent6>
+        <a:srgbClr val="4EA72E"/>
+      </a:accent6>
+      <a:hlink>
+        <a:srgbClr val="467886"/>
+      </a:hlink>
+      <a:folHlink>
+        <a:srgbClr val="96607D"/>
+      </a:folHlink>
+    </a:clrScheme>
+    <a:fontScheme name="Office">
+      <a:majorFont>
+        <a:latin typeface="Aptos Display" panose="02110004020202020204"/>
+        <a:ea typeface=""/>
+        <a:cs typeface=""/>
+        <a:font script="Jpan" typeface="游ゴシック Light"/>
+        <a:font script="Hang" typeface="맑은 고딕"/>
+        <a:font script="Hans" typeface="等线 Light"/>
+        <a:font script="Hant" typeface="新細明體"/>
+        <a:font script="Arab" typeface="Times New Roman"/>
+        <a:font script="Hebr" typeface="Times New Roman"/>
+        <a:font script="Thai" typeface="Angsana New"/>
+        <a:font script="Ethi" typeface="Nyala"/>
+        <a:font script="Beng" typeface="Vrinda"/>
+        <a:font script="Gujr" typeface="Shruti"/>
+        <a:font script="Khmr" typeface="MoolBoran"/>
+        <a:font script="Knda" typeface="Tunga"/>
+        <a:font script="Guru" typeface="Raavi"/>
+        <a:font script="Cans" typeface="Euphemia"/>
+        <a:font script="Cher" typeface="Plantagenet Cherokee"/>
+        <a:font script="Yiii" typeface="Microsoft Yi Baiti"/>
+        <a:font script="Tibt" typeface="Microsoft Himalaya"/>
+        <a:font script="Thaa" typeface="MV Boli"/>
+        <a:font script="Deva" typeface="Mangal"/>
+        <a:font script="Telu" typeface="Gautami"/>
+        <a:font script="Taml" typeface="Latha"/>
+        <a:font script="Syrc" typeface="Estrangelo Edessa"/>
+        <a:font script="Orya" typeface="Kalinga"/>
+        <a:font script="Mlym" typeface="Kartika"/>
+        <a:font script="Laoo" typeface="DokChampa"/>
+        <a:font script="Sinh" typeface="Iskoola Pota"/>
+        <a:font script="Mong" typeface="Mongolian Baiti"/>
+        <a:font script="Viet" typeface="Times New Roman"/>
+        <a:font script="Uigh" typeface="Microsoft Uighur"/>
+        <a:font script="Geor" typeface="Sylfaen"/>
+        <a:font script="Armn" typeface="Arial"/>
+        <a:font script="Bugi" typeface="Leelawadee UI"/>
+        <a:font script="Bopo" typeface="Microsoft JhengHei"/>
+        <a:font script="Java" typeface="Javanese Text"/>
+        <a:font script="Lisu" typeface="Segoe UI"/>
+        <a:font script="Mymr" typeface="Myanmar Text"/>
+        <a:font script="Nkoo" typeface="Ebrima"/>
+        <a:font script="Olck" typeface="Nirmala UI"/>
+        <a:font script="Osma" typeface="Ebrima"/>
+        <a:font script="Phag" typeface="Phagspa"/>
+        <a:font script="Syrn" typeface="Estrangelo Edessa"/>
+        <a:font script="Syrj" typeface="Estrangelo Edessa"/>
+        <a:font script="Syre" typeface="Estrangelo Edessa"/>
+        <a:font script="Sora" typeface="Nirmala UI"/>
+        <a:font script="Tale" typeface="Microsoft Tai Le"/>
+        <a:font script="Talu" typeface="Microsoft New Tai Lue"/>
+        <a:font script="Tfng" typeface="Ebrima"/>
+      </a:majorFont>
+      <a:minorFont>
+        <a:latin typeface="Aptos" panose="02110004020202020204"/>
+        <a:ea typeface=""/>
+        <a:cs typeface=""/>
+        <a:font script="Jpan" typeface="游ゴシック"/>
+        <a:font script="Hang" typeface="맑은 고딕"/>
+        <a:font script="Hans" typeface="等线"/>
+        <a:font script="Hant" typeface="新細明體"/>
+        <a:font script="Arab" typeface="Arial"/>
+        <a:font script="Hebr" typeface="Arial"/>
+        <a:font script="Thai" typeface="Cordia New"/>
+        <a:font script="Ethi" typeface="Nyala"/>
+        <a:font script="Beng" typeface="Vrinda"/>
+        <a:font script="Gujr" typeface="Shruti"/>
+        <a:font script="Khmr" typeface="DaunPenh"/>
+        <a:font script="Knda" typeface="Tunga"/>
+        <a:font script="Guru" typeface="Raavi"/>
+        <a:font script="Cans" typeface="Euphemia"/>
+        <a:font script="Cher" typeface="Plantagenet Cherokee"/>
+        <a:font script="Yiii" typeface="Microsoft Yi Baiti"/>
+        <a:font script="Tibt" typeface="Microsoft Himalaya"/>
+        <a:font script="Thaa" typeface="MV Boli"/>
+        <a:font script="Deva" typeface="Mangal"/>
+        <a:font script="Telu" typeface="Gautami"/>
+        <a:font script="Taml" typeface="Latha"/>
+        <a:font script="Syrc" typeface="Estrangelo Edessa"/>
+        <a:font script="Orya" typeface="Kalinga"/>
+        <a:font script="Mlym" typeface="Kartika"/>
+        <a:font script="Laoo" typeface="DokChampa"/>
+        <a:font script="Sinh" typeface="Iskoola Pota"/>
+        <a:font script="Mong" typeface="Mongolian Baiti"/>
+        <a:font script="Viet" typeface="Arial"/>
+        <a:font script="Uigh" typeface="Microsoft Uighur"/>
+        <a:font script="Geor" typeface="Sylfaen"/>
+        <a:font script="Armn" typeface="Arial"/>
+        <a:font script="Bugi" typeface="Leelawadee UI"/>
+        <a:font script="Bopo" typeface="Microsoft JhengHei"/>
+        <a:font script="Java" typeface="Javanese Text"/>
+        <a:font script="Lisu" typeface="Segoe UI"/>
+        <a:font script="Mymr" typeface="Myanmar Text"/>
+        <a:font script="Nkoo" typeface="Ebrima"/>
+        <a:font script="Olck" typeface="Nirmala UI"/>
+        <a:font script="Osma" typeface="Ebrima"/>
+        <a:font script="Phag" typeface="Phagspa"/>
+        <a:font script="Syrn" typeface="Estrangelo Edessa"/>
+        <a:font script="Syrj" typeface="Estrangelo Edessa"/>
+        <a:font script="Syre" typeface="Estrangelo Edessa"/>
+        <a:font script="Sora" typeface="Nirmala UI"/>
+        <a:font script="Tale" typeface="Microsoft Tai Le"/>
+        <a:font script="Talu" typeface="Microsoft New Tai Lue"/>
+        <a:font script="Tfng" typeface="Ebrima"/>
+      </a:minorFont>
+    </a:fontScheme>
+    <a:fmtScheme name="Office">
+      <a:fillStyleLst>
+        <a:solidFill>
+          <a:schemeClr val="phClr"/>
+        </a:solidFill>
+        <a:gradFill rotWithShape="1">
+          <a:gsLst>
+            <a:gs pos="0">
+              <a:schemeClr val="phClr">
+                <a:lumMod val="110000"/>
+                <a:satMod val="105000"/>
+                <a:tint val="67000"/>
+              </a:schemeClr>
+            </a:gs>
+            <a:gs pos="50000">
+              <a:schemeClr val="phClr">
+                <a:lumMod val="105000"/>
+                <a:satMod val="103000"/>
+                <a:tint val="73000"/>
+              </a:schemeClr>
+            </a:gs>
+            <a:gs pos="100000">
+              <a:schemeClr val="phClr">
+                <a:lumMod val="105000"/>
+                <a:satMod val="109000"/>
+                <a:tint val="81000"/>
+              </a:schemeClr>
+            </a:gs>
+          </a:gsLst>
+          <a:lin ang="5400000" scaled="0"/>
+        </a:gradFill>
+        <a:gradFill rotWithShape="1">
+          <a:gsLst>
+            <a:gs pos="0">
+              <a:schemeClr val="phClr">
+                <a:satMod val="103000"/>
+                <a:lumMod val="102000"/>
+                <a:tint val="94000"/>
+              </a:schemeClr>
+            </a:gs>
+            <a:gs pos="50000">
+              <a:schemeClr val="phClr">
+                <a:satMod val="110000"/>
+                <a:lumMod val="100000"/>
+                <a:shade val="100000"/>
+              </a:schemeClr>
+            </a:gs>
+            <a:gs pos="100000">
+              <a:schemeClr val="phClr">
+                <a:lumMod val="99000"/>
+                <a:satMod val="120000"/>
+                <a:shade val="78000"/>
+              </a:schemeClr>
+            </a:gs>
+          </a:gsLst>
+          <a:lin ang="5400000" scaled="0"/>
+        </a:gradFill>
+      </a:fillStyleLst>
+      <a:lnStyleLst>
+        <a:ln w="12700" cap="flat" cmpd="sng" algn="ctr">
+          <a:solidFill>
+            <a:schemeClr val="phClr"/>
+          </a:solidFill>
+          <a:prstDash val="solid"/>
+          <a:miter lim="800000"/>
+        </a:ln>
+        <a:ln w="19050" cap="flat" cmpd="sng" algn="ctr">
+          <a:solidFill>
+            <a:schemeClr val="phClr"/>
+          </a:solidFill>
+          <a:prstDash val="solid"/>
+          <a:miter lim="800000"/>
+        </a:ln>
+        <a:ln w="25400" cap="flat" cmpd="sng" algn="ctr">
+          <a:solidFill>
+            <a:schemeClr val="phClr"/>
+          </a:solidFill>
+          <a:prstDash val="solid"/>
+          <a:miter lim="800000"/>
+        </a:ln>
+      </a:lnStyleLst>
+      <a:effectStyleLst>
+        <a:effectStyle>
+          <a:effectLst/>
+        </a:effectStyle>
+        <a:effectStyle>
+          <a:effectLst/>
+        </a:effectStyle>
+        <a:effectStyle>
+          <a:effectLst>
+            <a:outerShdw blurRad="57150" dist="19050" dir="5400000" algn="ctr" rotWithShape="0">
+              <a:srgbClr val="000000">
+                <a:alpha val="63000"/>
+              </a:srgbClr>
+            </a:outerShdw>
+          </a:effectLst>
+        </a:effectStyle>
+      </a:effectStyleLst>
+      <a:bgFillStyleLst>
+        <a:solidFill>
+          <a:schemeClr val="phClr"/>
+        </a:solidFill>
+        <a:solidFill>
+          <a:schemeClr val="phClr">
+            <a:tint val="95000"/>
+            <a:satMod val="170000"/>
+          </a:schemeClr>
+        </a:solidFill>
+        <a:gradFill rotWithShape="1">
+          <a:gsLst>
+            <a:gs pos="0">
+              <a:schemeClr val="phClr">
+                <a:tint val="93000"/>
+                <a:satMod val="150000"/>
+                <a:shade val="98000"/>
+                <a:lumMod val="102000"/>
+              </a:schemeClr>
+            </a:gs>
+            <a:gs pos="50000">
+              <a:schemeClr val="phClr">
+                <a:tint val="98000"/>
+                <a:satMod val="130000"/>
+                <a:shade val="90000"/>
+                <a:lumMod val="103000"/>
+              </a:schemeClr>
+            </a:gs>
+            <a:gs pos="100000">
+              <a:schemeClr val="phClr">
+                <a:shade val="63000"/>
+                <a:satMod val="120000"/>
+              </a:schemeClr>
+            </a:gs>
+          </a:gsLst>
+          <a:lin ang="5400000" scaled="0"/>
+        </a:gradFill>
+      </a:bgFillStyleLst>
+    </a:fmtScheme>
+  </a:themeElements>
+  <a:objectDefaults>
+    <a:lnDef>
+      <a:spPr/>
+      <a:bodyPr/>
+      <a:lstStyle/>
+      <a:style>
+        <a:lnRef idx="2">
+          <a:schemeClr val="accent1"/>
+        </a:lnRef>
+        <a:fillRef idx="0">
+          <a:schemeClr val="accent1"/>
+        </a:fillRef>
+        <a:effectRef idx="1">
+          <a:schemeClr val="accent1"/>
+        </a:effectRef>
+        <a:fontRef idx="minor">
+          <a:schemeClr val="tx1"/>
+        </a:fontRef>
+      </a:style>
+    </a:lnDef>
+  </a:objectDefaults>
+  <a:extraClrSchemeLst/>
+  <a:extLst>
+    <a:ext uri="{05A4C25C-085E-4340-85A3-A5531E510DB2}">
+      <thm15:themeFamily xmlns:thm15="http://schemas.microsoft.com/office/thememl/2012/main" name="Office Theme" id="{2E142A2C-CD16-42D6-873A-C26D2A0506FA}" vid="{1BDDFF52-6CD6-40A5-AB3C-68EB2F1E4D0A}"/>
+    </a:ext>
+  </a:extLst>
+</a:theme>
 </file>
</xml_diff>